<commit_message>
Update Group 45 Data Science for Case Law.pptx
</commit_message>
<xml_diff>
--- a/Group 45 Data Science for Case Law.pptx
+++ b/Group 45 Data Science for Case Law.pptx
@@ -7,15 +7,15 @@
   <p:sldIdLst>
     <p:sldId id="257" r:id="rId2"/>
     <p:sldId id="260" r:id="rId3"/>
-    <p:sldId id="272" r:id="rId4"/>
-    <p:sldId id="261" r:id="rId5"/>
-    <p:sldId id="262" r:id="rId6"/>
-    <p:sldId id="263" r:id="rId7"/>
-    <p:sldId id="266" r:id="rId8"/>
-    <p:sldId id="267" r:id="rId9"/>
-    <p:sldId id="268" r:id="rId10"/>
-    <p:sldId id="270" r:id="rId11"/>
-    <p:sldId id="271" r:id="rId12"/>
+    <p:sldId id="267" r:id="rId4"/>
+    <p:sldId id="268" r:id="rId5"/>
+    <p:sldId id="270" r:id="rId6"/>
+    <p:sldId id="271" r:id="rId7"/>
+    <p:sldId id="272" r:id="rId8"/>
+    <p:sldId id="261" r:id="rId9"/>
+    <p:sldId id="262" r:id="rId10"/>
+    <p:sldId id="263" r:id="rId11"/>
+    <p:sldId id="266" r:id="rId12"/>
     <p:sldId id="265" r:id="rId13"/>
   </p:sldIdLst>
   <p:sldSz cx="12192000" cy="6858000"/>
@@ -117,7 +117,7 @@
   </p:defaultTextStyle>
   <p:extLst>
     <p:ext uri="{EFAFB233-063F-42B5-8137-9DF3F51BA10A}">
-      <p15:sldGuideLst xmlns:p15="http://schemas.microsoft.com/office/powerpoint/2012/main" xmlns=""/>
+      <p15:sldGuideLst xmlns="" xmlns:p15="http://schemas.microsoft.com/office/powerpoint/2012/main"/>
     </p:ext>
   </p:extLst>
 </p:presentation>
@@ -145,7 +145,7 @@
           <p:cNvPr id="10" name="Rectangle 9">
             <a:extLst>
               <a:ext uri="{FF2B5EF4-FFF2-40B4-BE49-F238E27FC236}">
-                <a16:creationId xmlns:a16="http://schemas.microsoft.com/office/drawing/2014/main" xmlns="" id="{39E3965E-AC41-4711-9D10-E25ABB132D86}"/>
+                <a16:creationId xmlns="" xmlns:a16="http://schemas.microsoft.com/office/drawing/2014/main" id="{39E3965E-AC41-4711-9D10-E25ABB132D86}"/>
               </a:ext>
             </a:extLst>
           </p:cNvPr>
@@ -305,7 +305,7 @@
           <p:cNvPr id="9" name="Straight Connector 8">
             <a:extLst>
               <a:ext uri="{FF2B5EF4-FFF2-40B4-BE49-F238E27FC236}">
-                <a16:creationId xmlns:a16="http://schemas.microsoft.com/office/drawing/2014/main" xmlns="" id="{1F5DC8C3-BA5F-4EED-BB9A-A14272BD82A1}"/>
+                <a16:creationId xmlns="" xmlns:a16="http://schemas.microsoft.com/office/drawing/2014/main" id="{1F5DC8C3-BA5F-4EED-BB9A-A14272BD82A1}"/>
               </a:ext>
             </a:extLst>
           </p:cNvPr>
@@ -349,7 +349,7 @@
           <p:cNvPr id="4" name="Date Placeholder 3">
             <a:extLst>
               <a:ext uri="{FF2B5EF4-FFF2-40B4-BE49-F238E27FC236}">
-                <a16:creationId xmlns:a16="http://schemas.microsoft.com/office/drawing/2014/main" xmlns="" id="{9925CCF1-92C0-4AF3-BFAF-4921631915AB}"/>
+                <a16:creationId xmlns="" xmlns:a16="http://schemas.microsoft.com/office/drawing/2014/main" id="{9925CCF1-92C0-4AF3-BFAF-4921631915AB}"/>
               </a:ext>
             </a:extLst>
           </p:cNvPr>
@@ -378,7 +378,7 @@
           <p:cNvPr id="5" name="Footer Placeholder 4">
             <a:extLst>
               <a:ext uri="{FF2B5EF4-FFF2-40B4-BE49-F238E27FC236}">
-                <a16:creationId xmlns:a16="http://schemas.microsoft.com/office/drawing/2014/main" xmlns="" id="{051A78A9-3DFF-4937-A9F2-5D8CF495F367}"/>
+                <a16:creationId xmlns="" xmlns:a16="http://schemas.microsoft.com/office/drawing/2014/main" id="{051A78A9-3DFF-4937-A9F2-5D8CF495F367}"/>
               </a:ext>
             </a:extLst>
           </p:cNvPr>
@@ -403,7 +403,7 @@
           <p:cNvPr id="6" name="Slide Number Placeholder 5">
             <a:extLst>
               <a:ext uri="{FF2B5EF4-FFF2-40B4-BE49-F238E27FC236}">
-                <a16:creationId xmlns:a16="http://schemas.microsoft.com/office/drawing/2014/main" xmlns="" id="{5FAEB271-5CC0-4759-BC6E-8BE53AB227C0}"/>
+                <a16:creationId xmlns="" xmlns:a16="http://schemas.microsoft.com/office/drawing/2014/main" id="{5FAEB271-5CC0-4759-BC6E-8BE53AB227C0}"/>
               </a:ext>
             </a:extLst>
           </p:cNvPr>
@@ -537,7 +537,7 @@
           <p:cNvPr id="7" name="Date Placeholder 6">
             <a:extLst>
               <a:ext uri="{FF2B5EF4-FFF2-40B4-BE49-F238E27FC236}">
-                <a16:creationId xmlns:a16="http://schemas.microsoft.com/office/drawing/2014/main" xmlns="" id="{7D5506EE-1026-4F35-9ACC-BD05BE0F9B36}"/>
+                <a16:creationId xmlns="" xmlns:a16="http://schemas.microsoft.com/office/drawing/2014/main" id="{7D5506EE-1026-4F35-9ACC-BD05BE0F9B36}"/>
               </a:ext>
             </a:extLst>
           </p:cNvPr>
@@ -566,7 +566,7 @@
           <p:cNvPr id="8" name="Footer Placeholder 7">
             <a:extLst>
               <a:ext uri="{FF2B5EF4-FFF2-40B4-BE49-F238E27FC236}">
-                <a16:creationId xmlns:a16="http://schemas.microsoft.com/office/drawing/2014/main" xmlns="" id="{B7696E5F-8D95-4450-AE52-5438E6EDE2BF}"/>
+                <a16:creationId xmlns="" xmlns:a16="http://schemas.microsoft.com/office/drawing/2014/main" id="{B7696E5F-8D95-4450-AE52-5438E6EDE2BF}"/>
               </a:ext>
             </a:extLst>
           </p:cNvPr>
@@ -591,7 +591,7 @@
           <p:cNvPr id="9" name="Slide Number Placeholder 8">
             <a:extLst>
               <a:ext uri="{FF2B5EF4-FFF2-40B4-BE49-F238E27FC236}">
-                <a16:creationId xmlns:a16="http://schemas.microsoft.com/office/drawing/2014/main" xmlns="" id="{999B2253-74CC-409E-BEB0-F8EFCFCB5629}"/>
+                <a16:creationId xmlns="" xmlns:a16="http://schemas.microsoft.com/office/drawing/2014/main" id="{999B2253-74CC-409E-BEB0-F8EFCFCB5629}"/>
               </a:ext>
             </a:extLst>
           </p:cNvPr>
@@ -650,7 +650,7 @@
           <p:cNvPr id="9" name="Rectangle 8">
             <a:extLst>
               <a:ext uri="{FF2B5EF4-FFF2-40B4-BE49-F238E27FC236}">
-                <a16:creationId xmlns:a16="http://schemas.microsoft.com/office/drawing/2014/main" xmlns="" id="{E1B68A5B-D9FA-424B-A4EB-30E7223836B3}"/>
+                <a16:creationId xmlns="" xmlns:a16="http://schemas.microsoft.com/office/drawing/2014/main" id="{E1B68A5B-D9FA-424B-A4EB-30E7223836B3}"/>
               </a:ext>
             </a:extLst>
           </p:cNvPr>
@@ -779,7 +779,7 @@
           <p:cNvPr id="7" name="Date Placeholder 6">
             <a:extLst>
               <a:ext uri="{FF2B5EF4-FFF2-40B4-BE49-F238E27FC236}">
-                <a16:creationId xmlns:a16="http://schemas.microsoft.com/office/drawing/2014/main" xmlns="" id="{AF33D6B0-F070-45C4-A472-19F432BE3932}"/>
+                <a16:creationId xmlns="" xmlns:a16="http://schemas.microsoft.com/office/drawing/2014/main" id="{AF33D6B0-F070-45C4-A472-19F432BE3932}"/>
               </a:ext>
             </a:extLst>
           </p:cNvPr>
@@ -808,7 +808,7 @@
           <p:cNvPr id="8" name="Footer Placeholder 7">
             <a:extLst>
               <a:ext uri="{FF2B5EF4-FFF2-40B4-BE49-F238E27FC236}">
-                <a16:creationId xmlns:a16="http://schemas.microsoft.com/office/drawing/2014/main" xmlns="" id="{9975399F-DAB2-410D-967F-ED17E6F796E7}"/>
+                <a16:creationId xmlns="" xmlns:a16="http://schemas.microsoft.com/office/drawing/2014/main" id="{9975399F-DAB2-410D-967F-ED17E6F796E7}"/>
               </a:ext>
             </a:extLst>
           </p:cNvPr>
@@ -833,7 +833,7 @@
           <p:cNvPr id="10" name="Slide Number Placeholder 9">
             <a:extLst>
               <a:ext uri="{FF2B5EF4-FFF2-40B4-BE49-F238E27FC236}">
-                <a16:creationId xmlns:a16="http://schemas.microsoft.com/office/drawing/2014/main" xmlns="" id="{F762A46F-6BE5-4D12-9412-5CA7672EA8EC}"/>
+                <a16:creationId xmlns="" xmlns:a16="http://schemas.microsoft.com/office/drawing/2014/main" id="{F762A46F-6BE5-4D12-9412-5CA7672EA8EC}"/>
               </a:ext>
             </a:extLst>
           </p:cNvPr>
@@ -967,7 +967,7 @@
           <p:cNvPr id="7" name="Date Placeholder 6">
             <a:extLst>
               <a:ext uri="{FF2B5EF4-FFF2-40B4-BE49-F238E27FC236}">
-                <a16:creationId xmlns:a16="http://schemas.microsoft.com/office/drawing/2014/main" xmlns="" id="{354D8B55-9EA8-4B81-8E84-9B93B0A27559}"/>
+                <a16:creationId xmlns="" xmlns:a16="http://schemas.microsoft.com/office/drawing/2014/main" id="{354D8B55-9EA8-4B81-8E84-9B93B0A27559}"/>
               </a:ext>
             </a:extLst>
           </p:cNvPr>
@@ -996,7 +996,7 @@
           <p:cNvPr id="8" name="Footer Placeholder 7">
             <a:extLst>
               <a:ext uri="{FF2B5EF4-FFF2-40B4-BE49-F238E27FC236}">
-                <a16:creationId xmlns:a16="http://schemas.microsoft.com/office/drawing/2014/main" xmlns="" id="{062CA021-2578-47CB-822C-BDDFF7223B28}"/>
+                <a16:creationId xmlns="" xmlns:a16="http://schemas.microsoft.com/office/drawing/2014/main" id="{062CA021-2578-47CB-822C-BDDFF7223B28}"/>
               </a:ext>
             </a:extLst>
           </p:cNvPr>
@@ -1021,7 +1021,7 @@
           <p:cNvPr id="9" name="Slide Number Placeholder 8">
             <a:extLst>
               <a:ext uri="{FF2B5EF4-FFF2-40B4-BE49-F238E27FC236}">
-                <a16:creationId xmlns:a16="http://schemas.microsoft.com/office/drawing/2014/main" xmlns="" id="{C4AAB51D-4141-4682-9375-DAFD5FB9DD10}"/>
+                <a16:creationId xmlns="" xmlns:a16="http://schemas.microsoft.com/office/drawing/2014/main" id="{C4AAB51D-4141-4682-9375-DAFD5FB9DD10}"/>
               </a:ext>
             </a:extLst>
           </p:cNvPr>
@@ -1088,7 +1088,7 @@
           <p:cNvPr id="10" name="Rectangle 9">
             <a:extLst>
               <a:ext uri="{FF2B5EF4-FFF2-40B4-BE49-F238E27FC236}">
-                <a16:creationId xmlns:a16="http://schemas.microsoft.com/office/drawing/2014/main" xmlns="" id="{A585C21A-8B93-4657-B5DF-7EAEAD3BE127}"/>
+                <a16:creationId xmlns="" xmlns:a16="http://schemas.microsoft.com/office/drawing/2014/main" id="{A585C21A-8B93-4657-B5DF-7EAEAD3BE127}"/>
               </a:ext>
             </a:extLst>
           </p:cNvPr>
@@ -1296,7 +1296,7 @@
           <p:cNvPr id="9" name="Straight Connector 8">
             <a:extLst>
               <a:ext uri="{FF2B5EF4-FFF2-40B4-BE49-F238E27FC236}">
-                <a16:creationId xmlns:a16="http://schemas.microsoft.com/office/drawing/2014/main" xmlns="" id="{459DE2C1-4C52-40A3-8959-27B2C1BEBFF6}"/>
+                <a16:creationId xmlns="" xmlns:a16="http://schemas.microsoft.com/office/drawing/2014/main" id="{459DE2C1-4C52-40A3-8959-27B2C1BEBFF6}"/>
               </a:ext>
             </a:extLst>
           </p:cNvPr>
@@ -1340,7 +1340,7 @@
           <p:cNvPr id="7" name="Date Placeholder 6">
             <a:extLst>
               <a:ext uri="{FF2B5EF4-FFF2-40B4-BE49-F238E27FC236}">
-                <a16:creationId xmlns:a16="http://schemas.microsoft.com/office/drawing/2014/main" xmlns="" id="{AAF2E137-EC28-48F8-9198-1F02539029B6}"/>
+                <a16:creationId xmlns="" xmlns:a16="http://schemas.microsoft.com/office/drawing/2014/main" id="{AAF2E137-EC28-48F8-9198-1F02539029B6}"/>
               </a:ext>
             </a:extLst>
           </p:cNvPr>
@@ -1369,7 +1369,7 @@
           <p:cNvPr id="8" name="Footer Placeholder 7">
             <a:extLst>
               <a:ext uri="{FF2B5EF4-FFF2-40B4-BE49-F238E27FC236}">
-                <a16:creationId xmlns:a16="http://schemas.microsoft.com/office/drawing/2014/main" xmlns="" id="{189422CD-6F62-4DD6-89EF-07A60B42D219}"/>
+                <a16:creationId xmlns="" xmlns:a16="http://schemas.microsoft.com/office/drawing/2014/main" id="{189422CD-6F62-4DD6-89EF-07A60B42D219}"/>
               </a:ext>
             </a:extLst>
           </p:cNvPr>
@@ -1394,7 +1394,7 @@
           <p:cNvPr id="11" name="Slide Number Placeholder 10">
             <a:extLst>
               <a:ext uri="{FF2B5EF4-FFF2-40B4-BE49-F238E27FC236}">
-                <a16:creationId xmlns:a16="http://schemas.microsoft.com/office/drawing/2014/main" xmlns="" id="{69C6AFF8-42B4-4D05-969B-9F5FB3355555}"/>
+                <a16:creationId xmlns="" xmlns:a16="http://schemas.microsoft.com/office/drawing/2014/main" id="{69C6AFF8-42B4-4D05-969B-9F5FB3355555}"/>
               </a:ext>
             </a:extLst>
           </p:cNvPr>
@@ -1595,7 +1595,7 @@
           <p:cNvPr id="2" name="Date Placeholder 1">
             <a:extLst>
               <a:ext uri="{FF2B5EF4-FFF2-40B4-BE49-F238E27FC236}">
-                <a16:creationId xmlns:a16="http://schemas.microsoft.com/office/drawing/2014/main" xmlns="" id="{5782D47D-B0DC-4C40-BCC6-BBBA32584A38}"/>
+                <a16:creationId xmlns="" xmlns:a16="http://schemas.microsoft.com/office/drawing/2014/main" id="{5782D47D-B0DC-4C40-BCC6-BBBA32584A38}"/>
               </a:ext>
             </a:extLst>
           </p:cNvPr>
@@ -1624,7 +1624,7 @@
           <p:cNvPr id="9" name="Footer Placeholder 8">
             <a:extLst>
               <a:ext uri="{FF2B5EF4-FFF2-40B4-BE49-F238E27FC236}">
-                <a16:creationId xmlns:a16="http://schemas.microsoft.com/office/drawing/2014/main" xmlns="" id="{4690D34E-7EBD-44B2-83CA-4C126A18D7EF}"/>
+                <a16:creationId xmlns="" xmlns:a16="http://schemas.microsoft.com/office/drawing/2014/main" id="{4690D34E-7EBD-44B2-83CA-4C126A18D7EF}"/>
               </a:ext>
             </a:extLst>
           </p:cNvPr>
@@ -1649,7 +1649,7 @@
           <p:cNvPr id="10" name="Slide Number Placeholder 9">
             <a:extLst>
               <a:ext uri="{FF2B5EF4-FFF2-40B4-BE49-F238E27FC236}">
-                <a16:creationId xmlns:a16="http://schemas.microsoft.com/office/drawing/2014/main" xmlns="" id="{2AC511A1-9BBD-42DE-92FB-2AF44F8E97A9}"/>
+                <a16:creationId xmlns="" xmlns:a16="http://schemas.microsoft.com/office/drawing/2014/main" id="{2AC511A1-9BBD-42DE-92FB-2AF44F8E97A9}"/>
               </a:ext>
             </a:extLst>
           </p:cNvPr>
@@ -1992,7 +1992,7 @@
           <p:cNvPr id="2" name="Date Placeholder 1">
             <a:extLst>
               <a:ext uri="{FF2B5EF4-FFF2-40B4-BE49-F238E27FC236}">
-                <a16:creationId xmlns:a16="http://schemas.microsoft.com/office/drawing/2014/main" xmlns="" id="{8AF8A515-AA94-45D1-9223-5C2272618D85}"/>
+                <a16:creationId xmlns="" xmlns:a16="http://schemas.microsoft.com/office/drawing/2014/main" id="{8AF8A515-AA94-45D1-9223-5C2272618D85}"/>
               </a:ext>
             </a:extLst>
           </p:cNvPr>
@@ -2021,7 +2021,7 @@
           <p:cNvPr id="11" name="Footer Placeholder 10">
             <a:extLst>
               <a:ext uri="{FF2B5EF4-FFF2-40B4-BE49-F238E27FC236}">
-                <a16:creationId xmlns:a16="http://schemas.microsoft.com/office/drawing/2014/main" xmlns="" id="{D052F5BC-98E0-4D60-AD67-9547738B7DD4}"/>
+                <a16:creationId xmlns="" xmlns:a16="http://schemas.microsoft.com/office/drawing/2014/main" id="{D052F5BC-98E0-4D60-AD67-9547738B7DD4}"/>
               </a:ext>
             </a:extLst>
           </p:cNvPr>
@@ -2046,7 +2046,7 @@
           <p:cNvPr id="12" name="Slide Number Placeholder 11">
             <a:extLst>
               <a:ext uri="{FF2B5EF4-FFF2-40B4-BE49-F238E27FC236}">
-                <a16:creationId xmlns:a16="http://schemas.microsoft.com/office/drawing/2014/main" xmlns="" id="{A38552DC-952E-41EA-AAAF-C2187523C0B0}"/>
+                <a16:creationId xmlns="" xmlns:a16="http://schemas.microsoft.com/office/drawing/2014/main" id="{A38552DC-952E-41EA-AAAF-C2187523C0B0}"/>
               </a:ext>
             </a:extLst>
           </p:cNvPr>
@@ -2128,7 +2128,7 @@
           <p:cNvPr id="6" name="Date Placeholder 5">
             <a:extLst>
               <a:ext uri="{FF2B5EF4-FFF2-40B4-BE49-F238E27FC236}">
-                <a16:creationId xmlns:a16="http://schemas.microsoft.com/office/drawing/2014/main" xmlns="" id="{7392073F-158F-44A3-8913-917AFFC1BC20}"/>
+                <a16:creationId xmlns="" xmlns:a16="http://schemas.microsoft.com/office/drawing/2014/main" id="{7392073F-158F-44A3-8913-917AFFC1BC20}"/>
               </a:ext>
             </a:extLst>
           </p:cNvPr>
@@ -2157,7 +2157,7 @@
           <p:cNvPr id="7" name="Footer Placeholder 6">
             <a:extLst>
               <a:ext uri="{FF2B5EF4-FFF2-40B4-BE49-F238E27FC236}">
-                <a16:creationId xmlns:a16="http://schemas.microsoft.com/office/drawing/2014/main" xmlns="" id="{EED72207-24CA-42B7-A975-2F8E41CBA904}"/>
+                <a16:creationId xmlns="" xmlns:a16="http://schemas.microsoft.com/office/drawing/2014/main" id="{EED72207-24CA-42B7-A975-2F8E41CBA904}"/>
               </a:ext>
             </a:extLst>
           </p:cNvPr>
@@ -2182,7 +2182,7 @@
           <p:cNvPr id="8" name="Slide Number Placeholder 7">
             <a:extLst>
               <a:ext uri="{FF2B5EF4-FFF2-40B4-BE49-F238E27FC236}">
-                <a16:creationId xmlns:a16="http://schemas.microsoft.com/office/drawing/2014/main" xmlns="" id="{D01080F2-251A-4B88-9A62-16F46D724F83}"/>
+                <a16:creationId xmlns="" xmlns:a16="http://schemas.microsoft.com/office/drawing/2014/main" id="{D01080F2-251A-4B88-9A62-16F46D724F83}"/>
               </a:ext>
             </a:extLst>
           </p:cNvPr>
@@ -2241,7 +2241,7 @@
           <p:cNvPr id="10" name="Rectangle 9">
             <a:extLst>
               <a:ext uri="{FF2B5EF4-FFF2-40B4-BE49-F238E27FC236}">
-                <a16:creationId xmlns:a16="http://schemas.microsoft.com/office/drawing/2014/main" xmlns="" id="{A8E9C91B-7EAD-4562-AB0E-DFB9663AECE3}"/>
+                <a16:creationId xmlns="" xmlns:a16="http://schemas.microsoft.com/office/drawing/2014/main" id="{A8E9C91B-7EAD-4562-AB0E-DFB9663AECE3}"/>
               </a:ext>
             </a:extLst>
           </p:cNvPr>
@@ -2285,7 +2285,7 @@
           <p:cNvPr id="2" name="Date Placeholder 1">
             <a:extLst>
               <a:ext uri="{FF2B5EF4-FFF2-40B4-BE49-F238E27FC236}">
-                <a16:creationId xmlns:a16="http://schemas.microsoft.com/office/drawing/2014/main" xmlns="" id="{94E9223F-721F-47BF-9FD5-0F8D12FF0DE1}"/>
+                <a16:creationId xmlns="" xmlns:a16="http://schemas.microsoft.com/office/drawing/2014/main" id="{94E9223F-721F-47BF-9FD5-0F8D12FF0DE1}"/>
               </a:ext>
             </a:extLst>
           </p:cNvPr>
@@ -2314,7 +2314,7 @@
           <p:cNvPr id="3" name="Footer Placeholder 2">
             <a:extLst>
               <a:ext uri="{FF2B5EF4-FFF2-40B4-BE49-F238E27FC236}">
-                <a16:creationId xmlns:a16="http://schemas.microsoft.com/office/drawing/2014/main" xmlns="" id="{05915714-6BBA-4593-8591-4E26F7D58D9F}"/>
+                <a16:creationId xmlns="" xmlns:a16="http://schemas.microsoft.com/office/drawing/2014/main" id="{05915714-6BBA-4593-8591-4E26F7D58D9F}"/>
               </a:ext>
             </a:extLst>
           </p:cNvPr>
@@ -2339,7 +2339,7 @@
           <p:cNvPr id="4" name="Slide Number Placeholder 3">
             <a:extLst>
               <a:ext uri="{FF2B5EF4-FFF2-40B4-BE49-F238E27FC236}">
-                <a16:creationId xmlns:a16="http://schemas.microsoft.com/office/drawing/2014/main" xmlns="" id="{BE06F857-D2E1-44DD-ABDD-EBB739645B67}"/>
+                <a16:creationId xmlns="" xmlns:a16="http://schemas.microsoft.com/office/drawing/2014/main" id="{BE06F857-D2E1-44DD-ABDD-EBB739645B67}"/>
               </a:ext>
             </a:extLst>
           </p:cNvPr>
@@ -2398,7 +2398,7 @@
           <p:cNvPr id="8" name="Rectangle 7">
             <a:extLst>
               <a:ext uri="{FF2B5EF4-FFF2-40B4-BE49-F238E27FC236}">
-                <a16:creationId xmlns:a16="http://schemas.microsoft.com/office/drawing/2014/main" xmlns="" id="{16D90D66-BCB9-4229-A829-628874352AC0}"/>
+                <a16:creationId xmlns="" xmlns:a16="http://schemas.microsoft.com/office/drawing/2014/main" id="{16D90D66-BCB9-4229-A829-628874352AC0}"/>
               </a:ext>
             </a:extLst>
           </p:cNvPr>
@@ -2737,7 +2737,7 @@
           <p:cNvPr id="8" name="Rectangle 7">
             <a:extLst>
               <a:ext uri="{FF2B5EF4-FFF2-40B4-BE49-F238E27FC236}">
-                <a16:creationId xmlns:a16="http://schemas.microsoft.com/office/drawing/2014/main" xmlns="" id="{DA134939-39C0-4522-A125-A13DFDA66490}"/>
+                <a16:creationId xmlns="" xmlns:a16="http://schemas.microsoft.com/office/drawing/2014/main" id="{DA134939-39C0-4522-A125-A13DFDA66490}"/>
               </a:ext>
             </a:extLst>
           </p:cNvPr>
@@ -3076,7 +3076,7 @@
           <p:cNvPr id="7" name="Rectangle 6">
             <a:extLst>
               <a:ext uri="{FF2B5EF4-FFF2-40B4-BE49-F238E27FC236}">
-                <a16:creationId xmlns:a16="http://schemas.microsoft.com/office/drawing/2014/main" xmlns="" id="{416A0E3C-60E6-4F39-BC55-5F7C224E1F7C}"/>
+                <a16:creationId xmlns="" xmlns:a16="http://schemas.microsoft.com/office/drawing/2014/main" id="{416A0E3C-60E6-4F39-BC55-5F7C224E1F7C}"/>
               </a:ext>
             </a:extLst>
           </p:cNvPr>
@@ -3328,7 +3328,7 @@
           <p:cNvPr id="10" name="Straight Connector 9">
             <a:extLst>
               <a:ext uri="{FF2B5EF4-FFF2-40B4-BE49-F238E27FC236}">
-                <a16:creationId xmlns:a16="http://schemas.microsoft.com/office/drawing/2014/main" xmlns="" id="{C5025DAC-8B93-4160-B017-3A274A5828C0}"/>
+                <a16:creationId xmlns="" xmlns:a16="http://schemas.microsoft.com/office/drawing/2014/main" id="{C5025DAC-8B93-4160-B017-3A274A5828C0}"/>
               </a:ext>
             </a:extLst>
           </p:cNvPr>
@@ -3779,10 +3779,10 @@
           <p:cNvPr id="22" name="Rectangle 21">
             <a:extLst>
               <a:ext uri="{FF2B5EF4-FFF2-40B4-BE49-F238E27FC236}">
-                <a16:creationId xmlns:a16="http://schemas.microsoft.com/office/drawing/2014/main" xmlns="" id="{A9286AD2-18A9-4868-A4E3-7A2097A20810}"/>
+                <a16:creationId xmlns="" xmlns:a16="http://schemas.microsoft.com/office/drawing/2014/main" id="{A9286AD2-18A9-4868-A4E3-7A2097A20810}"/>
               </a:ext>
               <a:ext uri="{C183D7F6-B498-43B3-948B-1728B52AA6E4}">
-                <adec:decorative xmlns:adec="http://schemas.microsoft.com/office/drawing/2017/decorative" xmlns="" val="1"/>
+                <adec:decorative xmlns="" xmlns:adec="http://schemas.microsoft.com/office/drawing/2017/decorative" val="1"/>
               </a:ext>
             </a:extLst>
           </p:cNvPr>
@@ -3792,7 +3792,7 @@
           <p:nvPr>
             <p:extLst>
               <p:ext uri="{386F3935-93C4-4BCD-93E2-E3B085C9AB24}">
-                <p16:designElem xmlns:p16="http://schemas.microsoft.com/office/powerpoint/2015/main" xmlns="" val="1"/>
+                <p16:designElem xmlns="" xmlns:p16="http://schemas.microsoft.com/office/powerpoint/2015/main" val="1"/>
               </p:ext>
             </p:extLst>
           </p:nvPr>
@@ -3839,7 +3839,7 @@
           <p:cNvPr id="2" name="Title 1">
             <a:extLst>
               <a:ext uri="{FF2B5EF4-FFF2-40B4-BE49-F238E27FC236}">
-                <a16:creationId xmlns:a16="http://schemas.microsoft.com/office/drawing/2014/main" xmlns="" id="{78FD68DA-43BA-4508-8DE2-BA9BB7B2FA5B}"/>
+                <a16:creationId xmlns="" xmlns:a16="http://schemas.microsoft.com/office/drawing/2014/main" id="{78FD68DA-43BA-4508-8DE2-BA9BB7B2FA5B}"/>
               </a:ext>
             </a:extLst>
           </p:cNvPr>
@@ -3875,7 +3875,7 @@
           <p:cNvPr id="3" name="Subtitle 2">
             <a:extLst>
               <a:ext uri="{FF2B5EF4-FFF2-40B4-BE49-F238E27FC236}">
-                <a16:creationId xmlns:a16="http://schemas.microsoft.com/office/drawing/2014/main" xmlns="" id="{A8E9CFF2-3777-4FF4-A759-8491175B0B7C}"/>
+                <a16:creationId xmlns="" xmlns:a16="http://schemas.microsoft.com/office/drawing/2014/main" id="{A8E9CFF2-3777-4FF4-A759-8491175B0B7C}"/>
               </a:ext>
             </a:extLst>
           </p:cNvPr>
@@ -3982,7 +3982,7 @@
           <p:cNvPr id="5" name="Picture 4" descr="A picture containing building, sitting, bench, side&#10;&#10;Description automatically generated">
             <a:extLst>
               <a:ext uri="{FF2B5EF4-FFF2-40B4-BE49-F238E27FC236}">
-                <a16:creationId xmlns:a16="http://schemas.microsoft.com/office/drawing/2014/main" xmlns="" id="{282CF6DD-7FE8-4063-9551-1B7BBCE92ABE}"/>
+                <a16:creationId xmlns="" xmlns:a16="http://schemas.microsoft.com/office/drawing/2014/main" id="{282CF6DD-7FE8-4063-9551-1B7BBCE92ABE}"/>
               </a:ext>
             </a:extLst>
           </p:cNvPr>
@@ -4017,10 +4017,10 @@
           <p:cNvPr id="24" name="Straight Connector 23">
             <a:extLst>
               <a:ext uri="{FF2B5EF4-FFF2-40B4-BE49-F238E27FC236}">
-                <a16:creationId xmlns:a16="http://schemas.microsoft.com/office/drawing/2014/main" xmlns="" id="{E7A7CD63-7EC3-44F3-95D0-595C4019FF24}"/>
+                <a16:creationId xmlns="" xmlns:a16="http://schemas.microsoft.com/office/drawing/2014/main" id="{E7A7CD63-7EC3-44F3-95D0-595C4019FF24}"/>
               </a:ext>
               <a:ext uri="{C183D7F6-B498-43B3-948B-1728B52AA6E4}">
-                <adec:decorative xmlns:adec="http://schemas.microsoft.com/office/drawing/2017/decorative" xmlns="" val="1"/>
+                <adec:decorative xmlns="" xmlns:adec="http://schemas.microsoft.com/office/drawing/2017/decorative" val="1"/>
               </a:ext>
             </a:extLst>
           </p:cNvPr>
@@ -4030,7 +4030,7 @@
           <p:nvPr>
             <p:extLst>
               <p:ext uri="{386F3935-93C4-4BCD-93E2-E3B085C9AB24}">
-                <p16:designElem xmlns:p16="http://schemas.microsoft.com/office/powerpoint/2015/main" xmlns="" val="1"/>
+                <p16:designElem xmlns="" xmlns:p16="http://schemas.microsoft.com/office/powerpoint/2015/main" val="1"/>
               </p:ext>
             </p:extLst>
           </p:nvPr>
@@ -4102,7 +4102,7 @@
           <p:cNvPr id="2" name="Title 1">
             <a:extLst>
               <a:ext uri="{FF2B5EF4-FFF2-40B4-BE49-F238E27FC236}">
-                <a16:creationId xmlns:a16="http://schemas.microsoft.com/office/drawing/2014/main" xmlns="" id="{CA344CBA-FB2B-44A2-9612-01FA04D41200}"/>
+                <a16:creationId xmlns="" xmlns:a16="http://schemas.microsoft.com/office/drawing/2014/main" id="{CA344CBA-FB2B-44A2-9612-01FA04D41200}"/>
               </a:ext>
             </a:extLst>
           </p:cNvPr>
@@ -4125,7 +4125,7 @@
           <a:p>
             <a:r>
               <a:rPr lang="en-US" dirty="0"/>
-              <a:t>Preparing the data</a:t>
+              <a:t>Our Research</a:t>
             </a:r>
           </a:p>
         </p:txBody>
@@ -4135,7 +4135,7 @@
           <p:cNvPr id="3" name="Content Placeholder 2">
             <a:extLst>
               <a:ext uri="{FF2B5EF4-FFF2-40B4-BE49-F238E27FC236}">
-                <a16:creationId xmlns:a16="http://schemas.microsoft.com/office/drawing/2014/main" xmlns="" id="{F66CA81D-1701-4C2D-AE08-277C299D9B85}"/>
+                <a16:creationId xmlns="" xmlns:a16="http://schemas.microsoft.com/office/drawing/2014/main" id="{F66CA81D-1701-4C2D-AE08-277C299D9B85}"/>
               </a:ext>
             </a:extLst>
           </p:cNvPr>
@@ -4149,12 +4149,12 @@
         <p:spPr>
           <a:xfrm>
             <a:off x="365760" y="1955800"/>
-            <a:ext cx="10896600" cy="4378959"/>
+            <a:ext cx="7487920" cy="4378959"/>
           </a:xfrm>
         </p:spPr>
         <p:txBody>
           <a:bodyPr>
-            <a:normAutofit/>
+            <a:normAutofit fontScale="62500" lnSpcReduction="20000"/>
           </a:bodyPr>
           <a:lstStyle/>
           <a:p>
@@ -4162,97 +4162,159 @@
               <a:buNone/>
             </a:pPr>
             <a:r>
+              <a:rPr lang="en-US" sz="2500" dirty="0">
+                <a:hlinkClick r:id="rId2"/>
+              </a:rPr>
+              <a:t>Extractive Summarization as Text Matching</a:t>
+            </a:r>
+            <a:r>
               <a:rPr lang="en-US" sz="2500" dirty="0"/>
-              <a:t>The steps to prepare the data for our models:</a:t>
-            </a:r>
-          </a:p>
-          <a:p>
-            <a:pPr marL="457200" indent="-457200">
-              <a:buAutoNum type="arabicParenR"/>
+              <a:t>: Most extractive summarization systems extract sentences one by one from the original text, model the relationship between the sentences , and then select several sentences to form a summary. and may not  consider the semantics of the entire summary. </a:t>
+            </a:r>
+          </a:p>
+          <a:p>
+            <a:pPr marL="0" indent="0">
+              <a:buNone/>
             </a:pPr>
             <a:r>
-              <a:rPr lang="en-US" sz="1200" dirty="0"/>
-              <a:t>Get a random set of data from </a:t>
-            </a:r>
-            <a:r>
-              <a:rPr lang="en-US" sz="1200" dirty="0" err="1"/>
-              <a:t>casebody.data</a:t>
-            </a:r>
-            <a:r>
-              <a:rPr lang="en-US" sz="1200" dirty="0"/>
-              <a:t>. We selected 10% of the rows</a:t>
-            </a:r>
-          </a:p>
-          <a:p>
-            <a:pPr marL="457200" indent="-457200">
-              <a:buAutoNum type="arabicParenR"/>
+              <a:rPr lang="en-US" sz="2500" dirty="0"/>
+              <a:t>This method performs Semantic text matching to estimate semantic similarity between a source and a target text fragment. It is trained on the CNN/ Daily Mail dataset and uses a Siamese-BERT(Bidirectional Encoder Representations from Transformers</a:t>
+            </a:r>
+            <a:r>
+              <a:rPr lang="en-US" dirty="0"/>
+              <a:t>) </a:t>
+            </a:r>
+            <a:r>
+              <a:rPr lang="en-US" sz="2500" dirty="0"/>
+              <a:t>architecture to compute the similarity between several candidate summaries to the source document and </a:t>
+            </a:r>
+            <a:r>
+              <a:rPr lang="en-US" sz="2500" dirty="0" err="1">
+                <a:solidFill>
+                  <a:srgbClr val="FF0000"/>
+                </a:solidFill>
+              </a:rPr>
+              <a:t>seledt</a:t>
+            </a:r>
+            <a:r>
+              <a:rPr lang="en-US" sz="2500" dirty="0">
+                <a:solidFill>
+                  <a:srgbClr val="FF0000"/>
+                </a:solidFill>
+              </a:rPr>
+              <a:t> </a:t>
+            </a:r>
+            <a:r>
+              <a:rPr lang="en-US" sz="2500" dirty="0"/>
+              <a:t>the best candidate summary.  </a:t>
+            </a:r>
+          </a:p>
+          <a:p>
+            <a:pPr marL="0" indent="0">
+              <a:buNone/>
             </a:pPr>
             <a:r>
-              <a:rPr lang="en-US" sz="1200" dirty="0"/>
-              <a:t>Extract headnotes from </a:t>
-            </a:r>
-            <a:r>
-              <a:rPr lang="en-US" sz="1200" dirty="0" err="1"/>
-              <a:t>casebody.data</a:t>
-            </a:r>
-            <a:endParaRPr lang="en-US" sz="1200" dirty="0"/>
-          </a:p>
-          <a:p>
-            <a:pPr marL="457200" indent="-457200">
-              <a:buAutoNum type="arabicParenR"/>
+              <a:rPr lang="en-US" sz="2500" dirty="0"/>
+              <a:t>A </a:t>
+            </a:r>
+            <a:r>
+              <a:rPr lang="en-US" sz="2500" b="1" dirty="0"/>
+              <a:t>Siamese</a:t>
+            </a:r>
+            <a:r>
+              <a:rPr lang="en-US" sz="2500" dirty="0"/>
+              <a:t> networks consists of two identical neural networks, each taking one of the two input inputs. The last layers of the two networks are then fed to a contrastive loss function , which calculates the similarity between the two inputs. </a:t>
+            </a:r>
+          </a:p>
+          <a:p>
+            <a:pPr marL="0" indent="0">
+              <a:buNone/>
             </a:pPr>
             <a:r>
-              <a:rPr lang="en-US" sz="1200" dirty="0"/>
-              <a:t>Extract majority opinion from </a:t>
-            </a:r>
-            <a:r>
-              <a:rPr lang="en-US" sz="1200" dirty="0" err="1"/>
-              <a:t>casebody.data</a:t>
-            </a:r>
-            <a:endParaRPr lang="en-US" sz="1200" dirty="0"/>
-          </a:p>
-          <a:p>
-            <a:pPr marL="457200" indent="-457200">
-              <a:buAutoNum type="arabicParenR"/>
-            </a:pPr>
-            <a:r>
-              <a:rPr lang="en-US" sz="1200" dirty="0"/>
-              <a:t>Save data where length of headnotes &gt; 150 and opinion is larger than the headnotes</a:t>
-            </a:r>
-          </a:p>
-          <a:p>
-            <a:pPr marL="457200" indent="-457200">
-              <a:buAutoNum type="arabicParenR"/>
-            </a:pPr>
-            <a:r>
-              <a:rPr lang="en-US" sz="1200" dirty="0"/>
-              <a:t>Tokenize the headnotes and opinions</a:t>
-            </a:r>
-          </a:p>
-          <a:p>
-            <a:pPr marL="457200" indent="-457200">
-              <a:buAutoNum type="arabicParenR"/>
-            </a:pPr>
-            <a:r>
-              <a:rPr lang="en-US" sz="1200" dirty="0"/>
-              <a:t>Preprocess using Bert preprocessor to label opinions. </a:t>
-            </a:r>
-          </a:p>
-          <a:p>
-            <a:pPr marL="457200" indent="-457200">
-              <a:buAutoNum type="arabicParenR"/>
-            </a:pPr>
-            <a:r>
-              <a:rPr lang="en-US" sz="1200" dirty="0"/>
-              <a:t>Split data into training testing and validation sets</a:t>
-            </a:r>
+              <a:rPr lang="en-US" sz="2500" dirty="0"/>
+              <a:t>Siamese BERT leverages the pre-trained BERT in a Siamese network structure to derive semantically meaningful text embeddings that can be compared using cosine-similarity. </a:t>
+            </a:r>
+          </a:p>
+        </p:txBody>
+      </p:sp>
+      <p:pic>
+        <p:nvPicPr>
+          <p:cNvPr id="5" name="Picture 4">
+            <a:extLst>
+              <a:ext uri="{FF2B5EF4-FFF2-40B4-BE49-F238E27FC236}">
+                <a16:creationId xmlns="" xmlns:a16="http://schemas.microsoft.com/office/drawing/2014/main" id="{668BF638-F52C-4FEE-B217-66970DBFBBD4}"/>
+              </a:ext>
+            </a:extLst>
+          </p:cNvPr>
+          <p:cNvPicPr>
+            <a:picLocks noChangeAspect="1"/>
+          </p:cNvPicPr>
+          <p:nvPr/>
+        </p:nvPicPr>
+        <p:blipFill>
+          <a:blip r:embed="rId3">
+            <a:extLst>
+              <a:ext uri="{28A0092B-C50C-407E-A947-70E740481C1C}">
+                <a14:useLocalDpi xmlns:a14="http://schemas.microsoft.com/office/drawing/2010/main" val="0"/>
+              </a:ext>
+            </a:extLst>
+          </a:blip>
+          <a:stretch>
+            <a:fillRect/>
+          </a:stretch>
+        </p:blipFill>
+        <p:spPr>
+          <a:xfrm>
+            <a:off x="8227377" y="2826702"/>
+            <a:ext cx="2676525" cy="1895475"/>
+          </a:xfrm>
+          <a:prstGeom prst="rect">
+            <a:avLst/>
+          </a:prstGeom>
+        </p:spPr>
+      </p:pic>
+      <p:sp>
+        <p:nvSpPr>
+          <p:cNvPr id="9" name="TextBox 8">
+            <a:extLst>
+              <a:ext uri="{FF2B5EF4-FFF2-40B4-BE49-F238E27FC236}">
+                <a16:creationId xmlns="" xmlns:a16="http://schemas.microsoft.com/office/drawing/2014/main" id="{EF3D1033-0999-46CA-98D2-EA188D7E4913}"/>
+              </a:ext>
+            </a:extLst>
+          </p:cNvPr>
+          <p:cNvSpPr txBox="1"/>
+          <p:nvPr/>
+        </p:nvSpPr>
+        <p:spPr>
+          <a:xfrm>
+            <a:off x="7889241" y="5024120"/>
+            <a:ext cx="4150360" cy="246221"/>
+          </a:xfrm>
+          <a:prstGeom prst="rect">
+            <a:avLst/>
+          </a:prstGeom>
+          <a:noFill/>
+        </p:spPr>
+        <p:txBody>
+          <a:bodyPr wrap="square" rtlCol="0">
+            <a:spAutoFit/>
+          </a:bodyPr>
+          <a:lstStyle/>
+          <a:p>
+            <a:r>
+              <a:rPr lang="en-US" sz="1000" dirty="0">
+                <a:hlinkClick r:id="rId2"/>
+              </a:rPr>
+              <a:t>Extractive Summarization as Text Matching</a:t>
+            </a:r>
+            <a:endParaRPr lang="en-US" sz="1000" dirty="0"/>
           </a:p>
         </p:txBody>
       </p:sp>
     </p:spTree>
     <p:extLst>
       <p:ext uri="{BB962C8B-B14F-4D97-AF65-F5344CB8AC3E}">
-        <p14:creationId xmlns:p14="http://schemas.microsoft.com/office/powerpoint/2010/main" val="1791440519"/>
+        <p14:creationId xmlns:p14="http://schemas.microsoft.com/office/powerpoint/2010/main" val="451383658"/>
       </p:ext>
     </p:extLst>
   </p:cSld>
@@ -4284,7 +4346,7 @@
           <p:cNvPr id="2" name="Title 1">
             <a:extLst>
               <a:ext uri="{FF2B5EF4-FFF2-40B4-BE49-F238E27FC236}">
-                <a16:creationId xmlns:a16="http://schemas.microsoft.com/office/drawing/2014/main" xmlns="" id="{CA344CBA-FB2B-44A2-9612-01FA04D41200}"/>
+                <a16:creationId xmlns="" xmlns:a16="http://schemas.microsoft.com/office/drawing/2014/main" id="{CA344CBA-FB2B-44A2-9612-01FA04D41200}"/>
               </a:ext>
             </a:extLst>
           </p:cNvPr>
@@ -4306,9 +4368,26 @@
           <a:lstStyle/>
           <a:p>
             <a:r>
-              <a:rPr lang="en-US" dirty="0"/>
-              <a:t>Steps for labeling data</a:t>
-            </a:r>
+              <a:rPr lang="en-US" dirty="0">
+                <a:solidFill>
+                  <a:srgbClr val="FF0000"/>
+                </a:solidFill>
+              </a:rPr>
+              <a:t>Our </a:t>
+            </a:r>
+            <a:r>
+              <a:rPr lang="en-US" dirty="0" smtClean="0">
+                <a:solidFill>
+                  <a:srgbClr val="FF0000"/>
+                </a:solidFill>
+              </a:rPr>
+              <a:t>Research (DUPLICATE)</a:t>
+            </a:r>
+            <a:endParaRPr lang="en-US" dirty="0">
+              <a:solidFill>
+                <a:srgbClr val="FF0000"/>
+              </a:solidFill>
+            </a:endParaRPr>
           </a:p>
         </p:txBody>
       </p:sp>
@@ -4317,7 +4396,7 @@
           <p:cNvPr id="3" name="Content Placeholder 2">
             <a:extLst>
               <a:ext uri="{FF2B5EF4-FFF2-40B4-BE49-F238E27FC236}">
-                <a16:creationId xmlns:a16="http://schemas.microsoft.com/office/drawing/2014/main" xmlns="" id="{F66CA81D-1701-4C2D-AE08-277C299D9B85}"/>
+                <a16:creationId xmlns="" xmlns:a16="http://schemas.microsoft.com/office/drawing/2014/main" id="{F66CA81D-1701-4C2D-AE08-277C299D9B85}"/>
               </a:ext>
             </a:extLst>
           </p:cNvPr>
@@ -4331,12 +4410,12 @@
         <p:spPr>
           <a:xfrm>
             <a:off x="365760" y="1955800"/>
-            <a:ext cx="10896600" cy="4378959"/>
+            <a:ext cx="7487920" cy="4378959"/>
           </a:xfrm>
         </p:spPr>
         <p:txBody>
           <a:bodyPr>
-            <a:normAutofit/>
+            <a:normAutofit fontScale="62500" lnSpcReduction="20000"/>
           </a:bodyPr>
           <a:lstStyle/>
           <a:p>
@@ -4344,104 +4423,147 @@
               <a:buNone/>
             </a:pPr>
             <a:r>
-              <a:rPr lang="en-US" sz="1800" dirty="0"/>
-              <a:t>The steps to prepare the data for our models:</a:t>
-            </a:r>
-          </a:p>
-          <a:p>
-            <a:pPr marL="457200" indent="-457200">
-              <a:buAutoNum type="arabicParenR"/>
+              <a:rPr lang="en-US" sz="2500" dirty="0">
+                <a:hlinkClick r:id="rId2"/>
+              </a:rPr>
+              <a:t>Extractive Summarization as Text Matching</a:t>
+            </a:r>
+            <a:r>
+              <a:rPr lang="en-US" sz="2500" dirty="0"/>
+              <a:t>: Most extractive summarization systems extract sentences one by one from the original text, model the relationship between the sentences , and then select several sentences to form a summary. and may not  consider the semantics of the entire summary. </a:t>
+            </a:r>
+          </a:p>
+          <a:p>
+            <a:pPr marL="0" indent="0">
+              <a:buNone/>
             </a:pPr>
             <a:r>
-              <a:rPr lang="en-US" sz="1800" dirty="0"/>
-              <a:t>For each sentence in opinion and compare it to the sentences in the headnotes. </a:t>
-            </a:r>
-          </a:p>
-          <a:p>
-            <a:pPr marL="457200" indent="-457200">
-              <a:buAutoNum type="arabicParenR"/>
+              <a:rPr lang="en-US" sz="2500" dirty="0"/>
+              <a:t>This method performs Semantic text matching to estimate semantic similarity between a source and a target text fragment. It is trained on the CNN/ Daily Mail dataset and uses a Siamese-BERT(Bidirectional Encoder Representations from Transformers</a:t>
+            </a:r>
+            <a:r>
+              <a:rPr lang="en-US" dirty="0"/>
+              <a:t>) </a:t>
+            </a:r>
+            <a:r>
+              <a:rPr lang="en-US" sz="2500" dirty="0"/>
+              <a:t>architecture to compute the similarity between several candidate summaries to the source document and </a:t>
+            </a:r>
+            <a:r>
+              <a:rPr lang="en-US" sz="2500" dirty="0" err="1"/>
+              <a:t>seledt</a:t>
+            </a:r>
+            <a:r>
+              <a:rPr lang="en-US" sz="2500" dirty="0"/>
+              <a:t> the best candidate summary.  </a:t>
+            </a:r>
+          </a:p>
+          <a:p>
+            <a:pPr marL="0" indent="0">
+              <a:buNone/>
             </a:pPr>
             <a:r>
-              <a:rPr lang="en-US" sz="1800" dirty="0"/>
-              <a:t>If the sentence increases the rouge score, select the sentence for the summary. </a:t>
-            </a:r>
-          </a:p>
-          <a:p>
-            <a:pPr marL="457200" indent="-457200">
-              <a:buAutoNum type="arabicParenR"/>
+              <a:rPr lang="en-US" sz="2500" dirty="0"/>
+              <a:t>A </a:t>
+            </a:r>
+            <a:r>
+              <a:rPr lang="en-US" sz="2500" b="1" dirty="0"/>
+              <a:t>Siamese</a:t>
+            </a:r>
+            <a:r>
+              <a:rPr lang="en-US" sz="2500" dirty="0"/>
+              <a:t> networks consists of two identical neural networks, each taking one of the two input inputs. The last layers of the two networks are then fed to a contrastive loss function , which calculates the similarity between the two inputs. </a:t>
+            </a:r>
+          </a:p>
+          <a:p>
+            <a:pPr marL="0" indent="0">
+              <a:buNone/>
             </a:pPr>
             <a:r>
-              <a:rPr lang="en-US" sz="1800" dirty="0"/>
-              <a:t>Label the tokenized opinion so that the sentences that are selected have a label of 1 and the sentence that is not selected has a label of 0</a:t>
-            </a:r>
-          </a:p>
-          <a:p>
-            <a:pPr marL="457200" indent="-457200">
-              <a:buAutoNum type="arabicParenR"/>
-            </a:pPr>
-            <a:r>
-              <a:rPr lang="en-US" sz="1800" dirty="0"/>
-              <a:t>Additional columns created are for each opinion</a:t>
-            </a:r>
-          </a:p>
-          <a:p>
-            <a:pPr marL="749808" lvl="1" indent="-457200">
-              <a:buFont typeface="Arial" panose="020B0604020202020204" pitchFamily="34" charset="0"/>
-              <a:buChar char="•"/>
-            </a:pPr>
-            <a:r>
-              <a:rPr lang="en-US" sz="1400" dirty="0"/>
-              <a:t>The starting index of each sentence</a:t>
-            </a:r>
-          </a:p>
-          <a:p>
-            <a:pPr marL="749808" lvl="1" indent="-457200">
-              <a:buFont typeface="Arial" panose="020B0604020202020204" pitchFamily="34" charset="0"/>
-              <a:buChar char="•"/>
-            </a:pPr>
-            <a:r>
-              <a:rPr lang="en-US" sz="1400" dirty="0"/>
-              <a:t>The rank of each word in an opinion</a:t>
-            </a:r>
-          </a:p>
-          <a:p>
-            <a:pPr marL="749808" lvl="1" indent="-457200">
-              <a:buFont typeface="Arial" panose="020B0604020202020204" pitchFamily="34" charset="0"/>
-              <a:buChar char="•"/>
-            </a:pPr>
-            <a:endParaRPr lang="en-US" sz="1400" dirty="0"/>
-          </a:p>
-          <a:p>
-            <a:pPr marL="749808" lvl="1" indent="-457200">
-              <a:buFont typeface="Arial" panose="020B0604020202020204" pitchFamily="34" charset="0"/>
-              <a:buChar char="•"/>
-            </a:pPr>
-            <a:endParaRPr lang="en-US" sz="1400" dirty="0"/>
-          </a:p>
-          <a:p>
-            <a:pPr marL="457200" indent="-457200">
-              <a:buAutoNum type="arabicParenR"/>
-            </a:pPr>
-            <a:endParaRPr lang="en-US" sz="1600" dirty="0"/>
-          </a:p>
-          <a:p>
-            <a:pPr marL="457200" indent="-457200">
-              <a:buAutoNum type="arabicParenR"/>
-            </a:pPr>
-            <a:endParaRPr lang="en-US" sz="2500" dirty="0"/>
-          </a:p>
-          <a:p>
-            <a:pPr marL="457200" indent="-457200">
-              <a:buAutoNum type="arabicParenR"/>
-            </a:pPr>
-            <a:endParaRPr lang="en-US" sz="2500" dirty="0"/>
+              <a:rPr lang="en-US" sz="2500" dirty="0"/>
+              <a:t>Siamese BERT leverages the pre-trained BERT in a Siamese network structure to derive semantically meaningful text embeddings that can be compared using cosine-similarity. </a:t>
+            </a:r>
+          </a:p>
+        </p:txBody>
+      </p:sp>
+      <p:pic>
+        <p:nvPicPr>
+          <p:cNvPr id="5" name="Picture 4">
+            <a:extLst>
+              <a:ext uri="{FF2B5EF4-FFF2-40B4-BE49-F238E27FC236}">
+                <a16:creationId xmlns="" xmlns:a16="http://schemas.microsoft.com/office/drawing/2014/main" id="{668BF638-F52C-4FEE-B217-66970DBFBBD4}"/>
+              </a:ext>
+            </a:extLst>
+          </p:cNvPr>
+          <p:cNvPicPr>
+            <a:picLocks noChangeAspect="1"/>
+          </p:cNvPicPr>
+          <p:nvPr/>
+        </p:nvPicPr>
+        <p:blipFill>
+          <a:blip r:embed="rId3">
+            <a:extLst>
+              <a:ext uri="{28A0092B-C50C-407E-A947-70E740481C1C}">
+                <a14:useLocalDpi xmlns:a14="http://schemas.microsoft.com/office/drawing/2010/main" val="0"/>
+              </a:ext>
+            </a:extLst>
+          </a:blip>
+          <a:stretch>
+            <a:fillRect/>
+          </a:stretch>
+        </p:blipFill>
+        <p:spPr>
+          <a:xfrm>
+            <a:off x="8227377" y="2826702"/>
+            <a:ext cx="2676525" cy="1895475"/>
+          </a:xfrm>
+          <a:prstGeom prst="rect">
+            <a:avLst/>
+          </a:prstGeom>
+        </p:spPr>
+      </p:pic>
+      <p:sp>
+        <p:nvSpPr>
+          <p:cNvPr id="9" name="TextBox 8">
+            <a:extLst>
+              <a:ext uri="{FF2B5EF4-FFF2-40B4-BE49-F238E27FC236}">
+                <a16:creationId xmlns="" xmlns:a16="http://schemas.microsoft.com/office/drawing/2014/main" id="{EF3D1033-0999-46CA-98D2-EA188D7E4913}"/>
+              </a:ext>
+            </a:extLst>
+          </p:cNvPr>
+          <p:cNvSpPr txBox="1"/>
+          <p:nvPr/>
+        </p:nvSpPr>
+        <p:spPr>
+          <a:xfrm>
+            <a:off x="7889241" y="5024120"/>
+            <a:ext cx="4150360" cy="246221"/>
+          </a:xfrm>
+          <a:prstGeom prst="rect">
+            <a:avLst/>
+          </a:prstGeom>
+          <a:noFill/>
+        </p:spPr>
+        <p:txBody>
+          <a:bodyPr wrap="square" rtlCol="0">
+            <a:spAutoFit/>
+          </a:bodyPr>
+          <a:lstStyle/>
+          <a:p>
+            <a:r>
+              <a:rPr lang="en-US" sz="1000" dirty="0">
+                <a:hlinkClick r:id="rId2"/>
+              </a:rPr>
+              <a:t>Extractive Summarization as Text Matching</a:t>
+            </a:r>
+            <a:endParaRPr lang="en-US" sz="1000" dirty="0"/>
           </a:p>
         </p:txBody>
       </p:sp>
     </p:spTree>
     <p:extLst>
       <p:ext uri="{BB962C8B-B14F-4D97-AF65-F5344CB8AC3E}">
-        <p14:creationId xmlns:p14="http://schemas.microsoft.com/office/powerpoint/2010/main" val="407012818"/>
+        <p14:creationId xmlns:p14="http://schemas.microsoft.com/office/powerpoint/2010/main" val="905971681"/>
       </p:ext>
     </p:extLst>
   </p:cSld>
@@ -4473,7 +4595,7 @@
           <p:cNvPr id="2" name="Title 1">
             <a:extLst>
               <a:ext uri="{FF2B5EF4-FFF2-40B4-BE49-F238E27FC236}">
-                <a16:creationId xmlns:a16="http://schemas.microsoft.com/office/drawing/2014/main" xmlns="" id="{CA344CBA-FB2B-44A2-9612-01FA04D41200}"/>
+                <a16:creationId xmlns="" xmlns:a16="http://schemas.microsoft.com/office/drawing/2014/main" id="{CA344CBA-FB2B-44A2-9612-01FA04D41200}"/>
               </a:ext>
             </a:extLst>
           </p:cNvPr>
@@ -4506,7 +4628,7 @@
           <p:cNvPr id="3" name="Content Placeholder 2">
             <a:extLst>
               <a:ext uri="{FF2B5EF4-FFF2-40B4-BE49-F238E27FC236}">
-                <a16:creationId xmlns:a16="http://schemas.microsoft.com/office/drawing/2014/main" xmlns="" id="{F66CA81D-1701-4C2D-AE08-277C299D9B85}"/>
+                <a16:creationId xmlns="" xmlns:a16="http://schemas.microsoft.com/office/drawing/2014/main" id="{F66CA81D-1701-4C2D-AE08-277C299D9B85}"/>
               </a:ext>
             </a:extLst>
           </p:cNvPr>
@@ -4633,7 +4755,7 @@
           <p:cNvPr id="2" name="Title 1">
             <a:extLst>
               <a:ext uri="{FF2B5EF4-FFF2-40B4-BE49-F238E27FC236}">
-                <a16:creationId xmlns:a16="http://schemas.microsoft.com/office/drawing/2014/main" xmlns="" id="{CA344CBA-FB2B-44A2-9612-01FA04D41200}"/>
+                <a16:creationId xmlns="" xmlns:a16="http://schemas.microsoft.com/office/drawing/2014/main" id="{CA344CBA-FB2B-44A2-9612-01FA04D41200}"/>
               </a:ext>
             </a:extLst>
           </p:cNvPr>
@@ -4661,7 +4783,7 @@
           <p:cNvPr id="3" name="Content Placeholder 2">
             <a:extLst>
               <a:ext uri="{FF2B5EF4-FFF2-40B4-BE49-F238E27FC236}">
-                <a16:creationId xmlns:a16="http://schemas.microsoft.com/office/drawing/2014/main" xmlns="" id="{F66CA81D-1701-4C2D-AE08-277C299D9B85}"/>
+                <a16:creationId xmlns="" xmlns:a16="http://schemas.microsoft.com/office/drawing/2014/main" id="{F66CA81D-1701-4C2D-AE08-277C299D9B85}"/>
               </a:ext>
             </a:extLst>
           </p:cNvPr>
@@ -4745,286 +4867,7 @@
           <p:cNvPr id="2" name="Title 1">
             <a:extLst>
               <a:ext uri="{FF2B5EF4-FFF2-40B4-BE49-F238E27FC236}">
-                <a16:creationId xmlns:a16="http://schemas.microsoft.com/office/drawing/2014/main" xmlns="" id="{CA344CBA-FB2B-44A2-9612-01FA04D41200}"/>
-              </a:ext>
-            </a:extLst>
-          </p:cNvPr>
-          <p:cNvSpPr>
-            <a:spLocks noGrp="1"/>
-          </p:cNvSpPr>
-          <p:nvPr>
-            <p:ph type="title"/>
-          </p:nvPr>
-        </p:nvSpPr>
-        <p:spPr/>
-        <p:txBody>
-          <a:bodyPr/>
-          <a:lstStyle/>
-          <a:p>
-            <a:r>
-              <a:rPr lang="en-US" dirty="0"/>
-              <a:t>Types of Summarizations</a:t>
-            </a:r>
-          </a:p>
-        </p:txBody>
-      </p:sp>
-      <p:sp>
-        <p:nvSpPr>
-          <p:cNvPr id="3" name="Content Placeholder 2">
-            <a:extLst>
-              <a:ext uri="{FF2B5EF4-FFF2-40B4-BE49-F238E27FC236}">
-                <a16:creationId xmlns:a16="http://schemas.microsoft.com/office/drawing/2014/main" xmlns="" id="{F66CA81D-1701-4C2D-AE08-277C299D9B85}"/>
-              </a:ext>
-            </a:extLst>
-          </p:cNvPr>
-          <p:cNvSpPr>
-            <a:spLocks noGrp="1"/>
-          </p:cNvSpPr>
-          <p:nvPr>
-            <p:ph idx="1"/>
-          </p:nvPr>
-        </p:nvSpPr>
-        <p:spPr/>
-        <p:txBody>
-          <a:bodyPr>
-            <a:normAutofit/>
-          </a:bodyPr>
-          <a:lstStyle/>
-          <a:p>
-            <a:pPr lvl="0"/>
-            <a:r>
-              <a:rPr lang="en-US" b="1" dirty="0"/>
-              <a:t>Extraction-based summarization</a:t>
-            </a:r>
-            <a:r>
-              <a:rPr lang="en-US" dirty="0"/>
-              <a:t>: Content is extracted from original document and is not modified. This method will extract key phrases or sentences to form a summary. The summary generated by this method may not be the same format as a human might express  it and the sentences may appear disjointed</a:t>
-            </a:r>
-          </a:p>
-          <a:p>
-            <a:pPr lvl="0"/>
-            <a:r>
-              <a:rPr lang="en-US" b="1" dirty="0"/>
-              <a:t>Abstraction-based summarization</a:t>
-            </a:r>
-            <a:r>
-              <a:rPr lang="en-US" dirty="0"/>
-              <a:t>: Abstractive methods generate a summary based on internal semantic representation of the original content, closer to what a human might express. Abstraction may transform the extracted content. Such transformation are computationally very challenging  , involving both NLP (natural language processing) and a deep understanding of the document </a:t>
-            </a:r>
-          </a:p>
-          <a:p>
-            <a:pPr marL="457200" indent="-457200">
-              <a:buAutoNum type="arabicParenR"/>
-            </a:pPr>
-            <a:endParaRPr lang="en-US" dirty="0"/>
-          </a:p>
-        </p:txBody>
-      </p:sp>
-    </p:spTree>
-    <p:extLst>
-      <p:ext uri="{BB962C8B-B14F-4D97-AF65-F5344CB8AC3E}">
-        <p14:creationId xmlns:p14="http://schemas.microsoft.com/office/powerpoint/2010/main" val="1897433995"/>
-      </p:ext>
-    </p:extLst>
-  </p:cSld>
-  <p:clrMapOvr>
-    <a:masterClrMapping/>
-  </p:clrMapOvr>
-</p:sld>
-</file>
-
-<file path=ppt/slides/slide4.xml><?xml version="1.0" encoding="utf-8"?>
-<p:sld xmlns:a="http://schemas.openxmlformats.org/drawingml/2006/main" xmlns:r="http://schemas.openxmlformats.org/officeDocument/2006/relationships" xmlns:p="http://schemas.openxmlformats.org/presentationml/2006/main">
-  <p:cSld>
-    <p:spTree>
-      <p:nvGrpSpPr>
-        <p:cNvPr id="1" name=""/>
-        <p:cNvGrpSpPr/>
-        <p:nvPr/>
-      </p:nvGrpSpPr>
-      <p:grpSpPr>
-        <a:xfrm>
-          <a:off x="0" y="0"/>
-          <a:ext cx="0" cy="0"/>
-          <a:chOff x="0" y="0"/>
-          <a:chExt cx="0" cy="0"/>
-        </a:xfrm>
-      </p:grpSpPr>
-      <p:sp>
-        <p:nvSpPr>
-          <p:cNvPr id="2" name="Title 1">
-            <a:extLst>
-              <a:ext uri="{FF2B5EF4-FFF2-40B4-BE49-F238E27FC236}">
-                <a16:creationId xmlns:a16="http://schemas.microsoft.com/office/drawing/2014/main" xmlns="" id="{CA344CBA-FB2B-44A2-9612-01FA04D41200}"/>
-              </a:ext>
-            </a:extLst>
-          </p:cNvPr>
-          <p:cNvSpPr>
-            <a:spLocks noGrp="1"/>
-          </p:cNvSpPr>
-          <p:nvPr>
-            <p:ph type="title"/>
-          </p:nvPr>
-        </p:nvSpPr>
-        <p:spPr/>
-        <p:txBody>
-          <a:bodyPr/>
-          <a:lstStyle/>
-          <a:p>
-            <a:r>
-              <a:rPr lang="en-US"/>
-              <a:t>Our Research</a:t>
-            </a:r>
-            <a:endParaRPr lang="en-US" dirty="0"/>
-          </a:p>
-        </p:txBody>
-      </p:sp>
-      <p:sp>
-        <p:nvSpPr>
-          <p:cNvPr id="3" name="Content Placeholder 2">
-            <a:extLst>
-              <a:ext uri="{FF2B5EF4-FFF2-40B4-BE49-F238E27FC236}">
-                <a16:creationId xmlns:a16="http://schemas.microsoft.com/office/drawing/2014/main" xmlns="" id="{F66CA81D-1701-4C2D-AE08-277C299D9B85}"/>
-              </a:ext>
-            </a:extLst>
-          </p:cNvPr>
-          <p:cNvSpPr>
-            <a:spLocks noGrp="1"/>
-          </p:cNvSpPr>
-          <p:nvPr>
-            <p:ph idx="1"/>
-          </p:nvPr>
-        </p:nvSpPr>
-        <p:spPr/>
-        <p:txBody>
-          <a:bodyPr>
-            <a:normAutofit/>
-          </a:bodyPr>
-          <a:lstStyle/>
-          <a:p>
-            <a:pPr marL="0" indent="0">
-              <a:buNone/>
-            </a:pPr>
-            <a:r>
-              <a:rPr lang="en-US" sz="2000" dirty="0"/>
-              <a:t>We searched for existing models that generate summaries based on the following criteria</a:t>
-            </a:r>
-            <a:endParaRPr lang="en-US" sz="4800" dirty="0"/>
-          </a:p>
-          <a:p>
-            <a:pPr>
-              <a:buFont typeface="Wingdings" panose="05000000000000000000" pitchFamily="2" charset="2"/>
-              <a:buChar char="§"/>
-            </a:pPr>
-            <a:r>
-              <a:rPr lang="en-US" dirty="0"/>
-              <a:t>Generate Extractive summaries since they can generate semantically and grammatically correct sentences these models need less resources and understanding of the domain.</a:t>
-            </a:r>
-          </a:p>
-          <a:p>
-            <a:pPr>
-              <a:buFont typeface="Wingdings" panose="05000000000000000000" pitchFamily="2" charset="2"/>
-              <a:buChar char="§"/>
-            </a:pPr>
-            <a:r>
-              <a:rPr lang="en-US" dirty="0"/>
-              <a:t>Summarize  long documents </a:t>
-            </a:r>
-          </a:p>
-          <a:p>
-            <a:pPr>
-              <a:buFont typeface="Wingdings" panose="05000000000000000000" pitchFamily="2" charset="2"/>
-              <a:buChar char="§"/>
-            </a:pPr>
-            <a:r>
-              <a:rPr lang="en-US" dirty="0"/>
-              <a:t>Perform well as measured by the </a:t>
-            </a:r>
-            <a:r>
-              <a:rPr lang="en-US" b="1" dirty="0"/>
-              <a:t>ROGUE</a:t>
-            </a:r>
-            <a:r>
-              <a:rPr lang="en-US" dirty="0"/>
-              <a:t> (</a:t>
-            </a:r>
-            <a:r>
-              <a:rPr lang="en-US" b="1" dirty="0"/>
-              <a:t>Recall-Oriented Understudy for </a:t>
-            </a:r>
-            <a:r>
-              <a:rPr lang="en-US" b="1" dirty="0" err="1"/>
-              <a:t>Gisting</a:t>
-            </a:r>
-            <a:r>
-              <a:rPr lang="en-US" b="1" dirty="0"/>
-              <a:t> Evaluation) Metric</a:t>
-            </a:r>
-            <a:r>
-              <a:rPr lang="en-US" dirty="0"/>
-              <a:t> Score. </a:t>
-            </a:r>
-          </a:p>
-          <a:p>
-            <a:pPr>
-              <a:buFont typeface="Wingdings" panose="05000000000000000000" pitchFamily="2" charset="2"/>
-              <a:buChar char="§"/>
-            </a:pPr>
-            <a:r>
-              <a:rPr lang="en-US" dirty="0"/>
-              <a:t>Can be implemented in the given time constraint</a:t>
-            </a:r>
-          </a:p>
-          <a:p>
-            <a:pPr marL="457200" indent="-457200">
-              <a:buAutoNum type="arabicParenR" startAt="3"/>
-            </a:pPr>
-            <a:endParaRPr lang="en-US" dirty="0"/>
-          </a:p>
-          <a:p>
-            <a:pPr marL="457200" indent="-457200">
-              <a:buAutoNum type="arabicParenR"/>
-            </a:pPr>
-            <a:endParaRPr lang="en-US" dirty="0"/>
-          </a:p>
-        </p:txBody>
-      </p:sp>
-    </p:spTree>
-    <p:extLst>
-      <p:ext uri="{BB962C8B-B14F-4D97-AF65-F5344CB8AC3E}">
-        <p14:creationId xmlns:p14="http://schemas.microsoft.com/office/powerpoint/2010/main" val="2529450920"/>
-      </p:ext>
-    </p:extLst>
-  </p:cSld>
-  <p:clrMapOvr>
-    <a:masterClrMapping/>
-  </p:clrMapOvr>
-</p:sld>
-</file>
-
-<file path=ppt/slides/slide5.xml><?xml version="1.0" encoding="utf-8"?>
-<p:sld xmlns:a="http://schemas.openxmlformats.org/drawingml/2006/main" xmlns:r="http://schemas.openxmlformats.org/officeDocument/2006/relationships" xmlns:p="http://schemas.openxmlformats.org/presentationml/2006/main">
-  <p:cSld>
-    <p:spTree>
-      <p:nvGrpSpPr>
-        <p:cNvPr id="1" name=""/>
-        <p:cNvGrpSpPr/>
-        <p:nvPr/>
-      </p:nvGrpSpPr>
-      <p:grpSpPr>
-        <a:xfrm>
-          <a:off x="0" y="0"/>
-          <a:ext cx="0" cy="0"/>
-          <a:chOff x="0" y="0"/>
-          <a:chExt cx="0" cy="0"/>
-        </a:xfrm>
-      </p:grpSpPr>
-      <p:sp>
-        <p:nvSpPr>
-          <p:cNvPr id="2" name="Title 1">
-            <a:extLst>
-              <a:ext uri="{FF2B5EF4-FFF2-40B4-BE49-F238E27FC236}">
-                <a16:creationId xmlns:a16="http://schemas.microsoft.com/office/drawing/2014/main" xmlns="" id="{CA344CBA-FB2B-44A2-9612-01FA04D41200}"/>
+                <a16:creationId xmlns="" xmlns:a16="http://schemas.microsoft.com/office/drawing/2014/main" id="{CA344CBA-FB2B-44A2-9612-01FA04D41200}"/>
               </a:ext>
             </a:extLst>
           </p:cNvPr>
@@ -5047,7 +4890,7 @@
           <a:p>
             <a:r>
               <a:rPr lang="en-US" dirty="0"/>
-              <a:t>Our Research</a:t>
+              <a:t>Exploratory Data Analysis</a:t>
             </a:r>
           </a:p>
         </p:txBody>
@@ -5057,628 +4900,7 @@
           <p:cNvPr id="3" name="Content Placeholder 2">
             <a:extLst>
               <a:ext uri="{FF2B5EF4-FFF2-40B4-BE49-F238E27FC236}">
-                <a16:creationId xmlns:a16="http://schemas.microsoft.com/office/drawing/2014/main" xmlns="" id="{F66CA81D-1701-4C2D-AE08-277C299D9B85}"/>
-              </a:ext>
-            </a:extLst>
-          </p:cNvPr>
-          <p:cNvSpPr>
-            <a:spLocks noGrp="1"/>
-          </p:cNvSpPr>
-          <p:nvPr>
-            <p:ph idx="1"/>
-          </p:nvPr>
-        </p:nvSpPr>
-        <p:spPr>
-          <a:xfrm>
-            <a:off x="365760" y="1955800"/>
-            <a:ext cx="10789920" cy="4378959"/>
-          </a:xfrm>
-        </p:spPr>
-        <p:txBody>
-          <a:bodyPr>
-            <a:normAutofit/>
-          </a:bodyPr>
-          <a:lstStyle/>
-          <a:p>
-            <a:pPr marL="0" indent="0">
-              <a:buNone/>
-            </a:pPr>
-            <a:r>
-              <a:rPr lang="en-US" sz="2500" dirty="0"/>
-              <a:t>The models we researched are</a:t>
-            </a:r>
-          </a:p>
-          <a:p>
-            <a:pPr marL="0" indent="0">
-              <a:buNone/>
-            </a:pPr>
-            <a:r>
-              <a:rPr lang="en-US" dirty="0">
-                <a:hlinkClick r:id="rId2"/>
-              </a:rPr>
-              <a:t>Text Summarization with Pretrained Encoders</a:t>
-            </a:r>
-            <a:r>
-              <a:rPr lang="en-US" sz="2500" dirty="0"/>
-              <a:t>: </a:t>
-            </a:r>
-            <a:r>
-              <a:rPr lang="en-US" dirty="0"/>
-              <a:t>Bidirectional Encoder Representations from Transformers (BERT; Devlin et al. 2019) represents a pretrained language models which have recently advanced a wide range of natural language processing tasks. </a:t>
-            </a:r>
-          </a:p>
-          <a:p>
-            <a:pPr marL="0" indent="0">
-              <a:buNone/>
-            </a:pPr>
-            <a:r>
-              <a:rPr lang="en-US" dirty="0"/>
-              <a:t>This model uses BERT for text summarization and propose a general framework for extractive models. This is a document-level encoder based on BERT which is able to express the semantics of a document and obtain representations for its sentences. Several inter sentence transformer layers are stacked over the </a:t>
-            </a:r>
-            <a:r>
-              <a:rPr lang="en-US" dirty="0">
-                <a:solidFill>
-                  <a:srgbClr val="FF0000"/>
-                </a:solidFill>
-              </a:rPr>
-              <a:t>BERY</a:t>
-            </a:r>
-            <a:r>
-              <a:rPr lang="en-US" dirty="0"/>
-              <a:t> encoder.</a:t>
-            </a:r>
-          </a:p>
-        </p:txBody>
-      </p:sp>
-    </p:spTree>
-    <p:extLst>
-      <p:ext uri="{BB962C8B-B14F-4D97-AF65-F5344CB8AC3E}">
-        <p14:creationId xmlns:p14="http://schemas.microsoft.com/office/powerpoint/2010/main" val="1008779348"/>
-      </p:ext>
-    </p:extLst>
-  </p:cSld>
-  <p:clrMapOvr>
-    <a:masterClrMapping/>
-  </p:clrMapOvr>
-</p:sld>
-</file>
-
-<file path=ppt/slides/slide6.xml><?xml version="1.0" encoding="utf-8"?>
-<p:sld xmlns:a="http://schemas.openxmlformats.org/drawingml/2006/main" xmlns:r="http://schemas.openxmlformats.org/officeDocument/2006/relationships" xmlns:p="http://schemas.openxmlformats.org/presentationml/2006/main">
-  <p:cSld>
-    <p:spTree>
-      <p:nvGrpSpPr>
-        <p:cNvPr id="1" name=""/>
-        <p:cNvGrpSpPr/>
-        <p:nvPr/>
-      </p:nvGrpSpPr>
-      <p:grpSpPr>
-        <a:xfrm>
-          <a:off x="0" y="0"/>
-          <a:ext cx="0" cy="0"/>
-          <a:chOff x="0" y="0"/>
-          <a:chExt cx="0" cy="0"/>
-        </a:xfrm>
-      </p:grpSpPr>
-      <p:sp>
-        <p:nvSpPr>
-          <p:cNvPr id="2" name="Title 1">
-            <a:extLst>
-              <a:ext uri="{FF2B5EF4-FFF2-40B4-BE49-F238E27FC236}">
-                <a16:creationId xmlns:a16="http://schemas.microsoft.com/office/drawing/2014/main" xmlns="" id="{CA344CBA-FB2B-44A2-9612-01FA04D41200}"/>
-              </a:ext>
-            </a:extLst>
-          </p:cNvPr>
-          <p:cNvSpPr>
-            <a:spLocks noGrp="1"/>
-          </p:cNvSpPr>
-          <p:nvPr>
-            <p:ph type="title"/>
-          </p:nvPr>
-        </p:nvSpPr>
-        <p:spPr>
-          <a:xfrm>
-            <a:off x="1097280" y="286603"/>
-            <a:ext cx="10058400" cy="1181517"/>
-          </a:xfrm>
-        </p:spPr>
-        <p:txBody>
-          <a:bodyPr/>
-          <a:lstStyle/>
-          <a:p>
-            <a:r>
-              <a:rPr lang="en-US" dirty="0"/>
-              <a:t>Our Research</a:t>
-            </a:r>
-          </a:p>
-        </p:txBody>
-      </p:sp>
-      <p:sp>
-        <p:nvSpPr>
-          <p:cNvPr id="3" name="Content Placeholder 2">
-            <a:extLst>
-              <a:ext uri="{FF2B5EF4-FFF2-40B4-BE49-F238E27FC236}">
-                <a16:creationId xmlns:a16="http://schemas.microsoft.com/office/drawing/2014/main" xmlns="" id="{F66CA81D-1701-4C2D-AE08-277C299D9B85}"/>
-              </a:ext>
-            </a:extLst>
-          </p:cNvPr>
-          <p:cNvSpPr>
-            <a:spLocks noGrp="1"/>
-          </p:cNvSpPr>
-          <p:nvPr>
-            <p:ph idx="1"/>
-          </p:nvPr>
-        </p:nvSpPr>
-        <p:spPr>
-          <a:xfrm>
-            <a:off x="365760" y="1955800"/>
-            <a:ext cx="7487920" cy="4378959"/>
-          </a:xfrm>
-        </p:spPr>
-        <p:txBody>
-          <a:bodyPr>
-            <a:normAutofit fontScale="62500" lnSpcReduction="20000"/>
-          </a:bodyPr>
-          <a:lstStyle/>
-          <a:p>
-            <a:pPr marL="0" indent="0">
-              <a:buNone/>
-            </a:pPr>
-            <a:r>
-              <a:rPr lang="en-US" sz="2500" dirty="0">
-                <a:hlinkClick r:id="rId2"/>
-              </a:rPr>
-              <a:t>Extractive Summarization as Text Matching</a:t>
-            </a:r>
-            <a:r>
-              <a:rPr lang="en-US" sz="2500" dirty="0"/>
-              <a:t>: Most extractive summarization systems extract sentences one by one from the original text, model the relationship between the sentences , and then select several sentences to form a summary. and may not  consider the semantics of the entire summary. </a:t>
-            </a:r>
-          </a:p>
-          <a:p>
-            <a:pPr marL="0" indent="0">
-              <a:buNone/>
-            </a:pPr>
-            <a:r>
-              <a:rPr lang="en-US" sz="2500" dirty="0"/>
-              <a:t>This method performs Semantic text matching to estimate semantic similarity between a source and a target text fragment. It is trained on the CNN/ Daily Mail dataset and uses a Siamese-BERT(Bidirectional Encoder Representations from Transformers</a:t>
-            </a:r>
-            <a:r>
-              <a:rPr lang="en-US" dirty="0"/>
-              <a:t>) </a:t>
-            </a:r>
-            <a:r>
-              <a:rPr lang="en-US" sz="2500" dirty="0"/>
-              <a:t>architecture to compute the similarity between several candidate summaries to the source document and </a:t>
-            </a:r>
-            <a:r>
-              <a:rPr lang="en-US" sz="2500" dirty="0" err="1">
-                <a:solidFill>
-                  <a:srgbClr val="FF0000"/>
-                </a:solidFill>
-              </a:rPr>
-              <a:t>seledt</a:t>
-            </a:r>
-            <a:r>
-              <a:rPr lang="en-US" sz="2500" dirty="0">
-                <a:solidFill>
-                  <a:srgbClr val="FF0000"/>
-                </a:solidFill>
-              </a:rPr>
-              <a:t> </a:t>
-            </a:r>
-            <a:r>
-              <a:rPr lang="en-US" sz="2500" dirty="0"/>
-              <a:t>the best candidate summary.  </a:t>
-            </a:r>
-          </a:p>
-          <a:p>
-            <a:pPr marL="0" indent="0">
-              <a:buNone/>
-            </a:pPr>
-            <a:r>
-              <a:rPr lang="en-US" sz="2500" dirty="0"/>
-              <a:t>A </a:t>
-            </a:r>
-            <a:r>
-              <a:rPr lang="en-US" sz="2500" b="1" dirty="0"/>
-              <a:t>Siamese</a:t>
-            </a:r>
-            <a:r>
-              <a:rPr lang="en-US" sz="2500" dirty="0"/>
-              <a:t> networks consists of two identical neural networks, each taking one of the two input inputs. The last layers of the two networks are then fed to a contrastive loss function , which calculates the similarity between the two inputs. </a:t>
-            </a:r>
-          </a:p>
-          <a:p>
-            <a:pPr marL="0" indent="0">
-              <a:buNone/>
-            </a:pPr>
-            <a:r>
-              <a:rPr lang="en-US" sz="2500" dirty="0"/>
-              <a:t>Siamese BERT leverages the pre-trained BERT in a Siamese network structure to derive semantically meaningful text embeddings that can be compared using cosine-similarity. </a:t>
-            </a:r>
-          </a:p>
-        </p:txBody>
-      </p:sp>
-      <p:pic>
-        <p:nvPicPr>
-          <p:cNvPr id="5" name="Picture 4">
-            <a:extLst>
-              <a:ext uri="{FF2B5EF4-FFF2-40B4-BE49-F238E27FC236}">
-                <a16:creationId xmlns:a16="http://schemas.microsoft.com/office/drawing/2014/main" xmlns="" id="{668BF638-F52C-4FEE-B217-66970DBFBBD4}"/>
-              </a:ext>
-            </a:extLst>
-          </p:cNvPr>
-          <p:cNvPicPr>
-            <a:picLocks noChangeAspect="1"/>
-          </p:cNvPicPr>
-          <p:nvPr/>
-        </p:nvPicPr>
-        <p:blipFill>
-          <a:blip r:embed="rId3">
-            <a:extLst>
-              <a:ext uri="{28A0092B-C50C-407E-A947-70E740481C1C}">
-                <a14:useLocalDpi xmlns:a14="http://schemas.microsoft.com/office/drawing/2010/main" val="0"/>
-              </a:ext>
-            </a:extLst>
-          </a:blip>
-          <a:stretch>
-            <a:fillRect/>
-          </a:stretch>
-        </p:blipFill>
-        <p:spPr>
-          <a:xfrm>
-            <a:off x="8227377" y="2826702"/>
-            <a:ext cx="2676525" cy="1895475"/>
-          </a:xfrm>
-          <a:prstGeom prst="rect">
-            <a:avLst/>
-          </a:prstGeom>
-        </p:spPr>
-      </p:pic>
-      <p:sp>
-        <p:nvSpPr>
-          <p:cNvPr id="9" name="TextBox 8">
-            <a:extLst>
-              <a:ext uri="{FF2B5EF4-FFF2-40B4-BE49-F238E27FC236}">
-                <a16:creationId xmlns:a16="http://schemas.microsoft.com/office/drawing/2014/main" xmlns="" id="{EF3D1033-0999-46CA-98D2-EA188D7E4913}"/>
-              </a:ext>
-            </a:extLst>
-          </p:cNvPr>
-          <p:cNvSpPr txBox="1"/>
-          <p:nvPr/>
-        </p:nvSpPr>
-        <p:spPr>
-          <a:xfrm>
-            <a:off x="7889241" y="5024120"/>
-            <a:ext cx="4150360" cy="246221"/>
-          </a:xfrm>
-          <a:prstGeom prst="rect">
-            <a:avLst/>
-          </a:prstGeom>
-          <a:noFill/>
-        </p:spPr>
-        <p:txBody>
-          <a:bodyPr wrap="square" rtlCol="0">
-            <a:spAutoFit/>
-          </a:bodyPr>
-          <a:lstStyle/>
-          <a:p>
-            <a:r>
-              <a:rPr lang="en-US" sz="1000" dirty="0">
-                <a:hlinkClick r:id="rId2"/>
-              </a:rPr>
-              <a:t>Extractive Summarization as Text Matching</a:t>
-            </a:r>
-            <a:endParaRPr lang="en-US" sz="1000" dirty="0"/>
-          </a:p>
-        </p:txBody>
-      </p:sp>
-    </p:spTree>
-    <p:extLst>
-      <p:ext uri="{BB962C8B-B14F-4D97-AF65-F5344CB8AC3E}">
-        <p14:creationId xmlns:p14="http://schemas.microsoft.com/office/powerpoint/2010/main" val="451383658"/>
-      </p:ext>
-    </p:extLst>
-  </p:cSld>
-  <p:clrMapOvr>
-    <a:masterClrMapping/>
-  </p:clrMapOvr>
-</p:sld>
-</file>
-
-<file path=ppt/slides/slide7.xml><?xml version="1.0" encoding="utf-8"?>
-<p:sld xmlns:a="http://schemas.openxmlformats.org/drawingml/2006/main" xmlns:r="http://schemas.openxmlformats.org/officeDocument/2006/relationships" xmlns:p="http://schemas.openxmlformats.org/presentationml/2006/main">
-  <p:cSld>
-    <p:spTree>
-      <p:nvGrpSpPr>
-        <p:cNvPr id="1" name=""/>
-        <p:cNvGrpSpPr/>
-        <p:nvPr/>
-      </p:nvGrpSpPr>
-      <p:grpSpPr>
-        <a:xfrm>
-          <a:off x="0" y="0"/>
-          <a:ext cx="0" cy="0"/>
-          <a:chOff x="0" y="0"/>
-          <a:chExt cx="0" cy="0"/>
-        </a:xfrm>
-      </p:grpSpPr>
-      <p:sp>
-        <p:nvSpPr>
-          <p:cNvPr id="2" name="Title 1">
-            <a:extLst>
-              <a:ext uri="{FF2B5EF4-FFF2-40B4-BE49-F238E27FC236}">
-                <a16:creationId xmlns:a16="http://schemas.microsoft.com/office/drawing/2014/main" xmlns="" id="{CA344CBA-FB2B-44A2-9612-01FA04D41200}"/>
-              </a:ext>
-            </a:extLst>
-          </p:cNvPr>
-          <p:cNvSpPr>
-            <a:spLocks noGrp="1"/>
-          </p:cNvSpPr>
-          <p:nvPr>
-            <p:ph type="title"/>
-          </p:nvPr>
-        </p:nvSpPr>
-        <p:spPr>
-          <a:xfrm>
-            <a:off x="1097280" y="286603"/>
-            <a:ext cx="10058400" cy="1181517"/>
-          </a:xfrm>
-        </p:spPr>
-        <p:txBody>
-          <a:bodyPr/>
-          <a:lstStyle/>
-          <a:p>
-            <a:r>
-              <a:rPr lang="en-US" dirty="0">
-                <a:solidFill>
-                  <a:srgbClr val="FF0000"/>
-                </a:solidFill>
-              </a:rPr>
-              <a:t>Our Research</a:t>
-            </a:r>
-          </a:p>
-        </p:txBody>
-      </p:sp>
-      <p:sp>
-        <p:nvSpPr>
-          <p:cNvPr id="3" name="Content Placeholder 2">
-            <a:extLst>
-              <a:ext uri="{FF2B5EF4-FFF2-40B4-BE49-F238E27FC236}">
-                <a16:creationId xmlns:a16="http://schemas.microsoft.com/office/drawing/2014/main" xmlns="" id="{F66CA81D-1701-4C2D-AE08-277C299D9B85}"/>
-              </a:ext>
-            </a:extLst>
-          </p:cNvPr>
-          <p:cNvSpPr>
-            <a:spLocks noGrp="1"/>
-          </p:cNvSpPr>
-          <p:nvPr>
-            <p:ph idx="1"/>
-          </p:nvPr>
-        </p:nvSpPr>
-        <p:spPr>
-          <a:xfrm>
-            <a:off x="365760" y="1955800"/>
-            <a:ext cx="7487920" cy="4378959"/>
-          </a:xfrm>
-        </p:spPr>
-        <p:txBody>
-          <a:bodyPr>
-            <a:normAutofit fontScale="62500" lnSpcReduction="20000"/>
-          </a:bodyPr>
-          <a:lstStyle/>
-          <a:p>
-            <a:pPr marL="0" indent="0">
-              <a:buNone/>
-            </a:pPr>
-            <a:r>
-              <a:rPr lang="en-US" sz="2500" dirty="0">
-                <a:hlinkClick r:id="rId2"/>
-              </a:rPr>
-              <a:t>Extractive Summarization as Text Matching</a:t>
-            </a:r>
-            <a:r>
-              <a:rPr lang="en-US" sz="2500" dirty="0"/>
-              <a:t>: Most extractive summarization systems extract sentences one by one from the original text, model the relationship between the sentences , and then select several sentences to form a summary. and may not  consider the semantics of the entire summary. </a:t>
-            </a:r>
-          </a:p>
-          <a:p>
-            <a:pPr marL="0" indent="0">
-              <a:buNone/>
-            </a:pPr>
-            <a:r>
-              <a:rPr lang="en-US" sz="2500" dirty="0"/>
-              <a:t>This method performs Semantic text matching to estimate semantic similarity between a source and a target text fragment. It is trained on the CNN/ Daily Mail dataset and uses a Siamese-BERT(Bidirectional Encoder Representations from Transformers</a:t>
-            </a:r>
-            <a:r>
-              <a:rPr lang="en-US" dirty="0"/>
-              <a:t>) </a:t>
-            </a:r>
-            <a:r>
-              <a:rPr lang="en-US" sz="2500" dirty="0"/>
-              <a:t>architecture to compute the similarity between several candidate summaries to the source document and </a:t>
-            </a:r>
-            <a:r>
-              <a:rPr lang="en-US" sz="2500" dirty="0" err="1"/>
-              <a:t>seledt</a:t>
-            </a:r>
-            <a:r>
-              <a:rPr lang="en-US" sz="2500" dirty="0"/>
-              <a:t> the best candidate summary.  </a:t>
-            </a:r>
-          </a:p>
-          <a:p>
-            <a:pPr marL="0" indent="0">
-              <a:buNone/>
-            </a:pPr>
-            <a:r>
-              <a:rPr lang="en-US" sz="2500" dirty="0"/>
-              <a:t>A </a:t>
-            </a:r>
-            <a:r>
-              <a:rPr lang="en-US" sz="2500" b="1" dirty="0"/>
-              <a:t>Siamese</a:t>
-            </a:r>
-            <a:r>
-              <a:rPr lang="en-US" sz="2500" dirty="0"/>
-              <a:t> networks consists of two identical neural networks, each taking one of the two input inputs. The last layers of the two networks are then fed to a contrastive loss function , which calculates the similarity between the two inputs. </a:t>
-            </a:r>
-          </a:p>
-          <a:p>
-            <a:pPr marL="0" indent="0">
-              <a:buNone/>
-            </a:pPr>
-            <a:r>
-              <a:rPr lang="en-US" sz="2500" dirty="0"/>
-              <a:t>Siamese BERT leverages the pre-trained BERT in a Siamese network structure to derive semantically meaningful text embeddings that can be compared using cosine-similarity. </a:t>
-            </a:r>
-          </a:p>
-        </p:txBody>
-      </p:sp>
-      <p:pic>
-        <p:nvPicPr>
-          <p:cNvPr id="5" name="Picture 4">
-            <a:extLst>
-              <a:ext uri="{FF2B5EF4-FFF2-40B4-BE49-F238E27FC236}">
-                <a16:creationId xmlns:a16="http://schemas.microsoft.com/office/drawing/2014/main" xmlns="" id="{668BF638-F52C-4FEE-B217-66970DBFBBD4}"/>
-              </a:ext>
-            </a:extLst>
-          </p:cNvPr>
-          <p:cNvPicPr>
-            <a:picLocks noChangeAspect="1"/>
-          </p:cNvPicPr>
-          <p:nvPr/>
-        </p:nvPicPr>
-        <p:blipFill>
-          <a:blip r:embed="rId3">
-            <a:extLst>
-              <a:ext uri="{28A0092B-C50C-407E-A947-70E740481C1C}">
-                <a14:useLocalDpi xmlns:a14="http://schemas.microsoft.com/office/drawing/2010/main" val="0"/>
-              </a:ext>
-            </a:extLst>
-          </a:blip>
-          <a:stretch>
-            <a:fillRect/>
-          </a:stretch>
-        </p:blipFill>
-        <p:spPr>
-          <a:xfrm>
-            <a:off x="8227377" y="2826702"/>
-            <a:ext cx="2676525" cy="1895475"/>
-          </a:xfrm>
-          <a:prstGeom prst="rect">
-            <a:avLst/>
-          </a:prstGeom>
-        </p:spPr>
-      </p:pic>
-      <p:sp>
-        <p:nvSpPr>
-          <p:cNvPr id="9" name="TextBox 8">
-            <a:extLst>
-              <a:ext uri="{FF2B5EF4-FFF2-40B4-BE49-F238E27FC236}">
-                <a16:creationId xmlns:a16="http://schemas.microsoft.com/office/drawing/2014/main" xmlns="" id="{EF3D1033-0999-46CA-98D2-EA188D7E4913}"/>
-              </a:ext>
-            </a:extLst>
-          </p:cNvPr>
-          <p:cNvSpPr txBox="1"/>
-          <p:nvPr/>
-        </p:nvSpPr>
-        <p:spPr>
-          <a:xfrm>
-            <a:off x="7889241" y="5024120"/>
-            <a:ext cx="4150360" cy="246221"/>
-          </a:xfrm>
-          <a:prstGeom prst="rect">
-            <a:avLst/>
-          </a:prstGeom>
-          <a:noFill/>
-        </p:spPr>
-        <p:txBody>
-          <a:bodyPr wrap="square" rtlCol="0">
-            <a:spAutoFit/>
-          </a:bodyPr>
-          <a:lstStyle/>
-          <a:p>
-            <a:r>
-              <a:rPr lang="en-US" sz="1000" dirty="0">
-                <a:hlinkClick r:id="rId2"/>
-              </a:rPr>
-              <a:t>Extractive Summarization as Text Matching</a:t>
-            </a:r>
-            <a:endParaRPr lang="en-US" sz="1000" dirty="0"/>
-          </a:p>
-        </p:txBody>
-      </p:sp>
-    </p:spTree>
-    <p:extLst>
-      <p:ext uri="{BB962C8B-B14F-4D97-AF65-F5344CB8AC3E}">
-        <p14:creationId xmlns:p14="http://schemas.microsoft.com/office/powerpoint/2010/main" val="905971681"/>
-      </p:ext>
-    </p:extLst>
-  </p:cSld>
-  <p:clrMapOvr>
-    <a:masterClrMapping/>
-  </p:clrMapOvr>
-</p:sld>
-</file>
-
-<file path=ppt/slides/slide8.xml><?xml version="1.0" encoding="utf-8"?>
-<p:sld xmlns:a="http://schemas.openxmlformats.org/drawingml/2006/main" xmlns:r="http://schemas.openxmlformats.org/officeDocument/2006/relationships" xmlns:p="http://schemas.openxmlformats.org/presentationml/2006/main">
-  <p:cSld>
-    <p:spTree>
-      <p:nvGrpSpPr>
-        <p:cNvPr id="1" name=""/>
-        <p:cNvGrpSpPr/>
-        <p:nvPr/>
-      </p:nvGrpSpPr>
-      <p:grpSpPr>
-        <a:xfrm>
-          <a:off x="0" y="0"/>
-          <a:ext cx="0" cy="0"/>
-          <a:chOff x="0" y="0"/>
-          <a:chExt cx="0" cy="0"/>
-        </a:xfrm>
-      </p:grpSpPr>
-      <p:sp>
-        <p:nvSpPr>
-          <p:cNvPr id="2" name="Title 1">
-            <a:extLst>
-              <a:ext uri="{FF2B5EF4-FFF2-40B4-BE49-F238E27FC236}">
-                <a16:creationId xmlns:a16="http://schemas.microsoft.com/office/drawing/2014/main" xmlns="" id="{CA344CBA-FB2B-44A2-9612-01FA04D41200}"/>
-              </a:ext>
-            </a:extLst>
-          </p:cNvPr>
-          <p:cNvSpPr>
-            <a:spLocks noGrp="1"/>
-          </p:cNvSpPr>
-          <p:nvPr>
-            <p:ph type="title"/>
-          </p:nvPr>
-        </p:nvSpPr>
-        <p:spPr>
-          <a:xfrm>
-            <a:off x="1097280" y="286603"/>
-            <a:ext cx="10058400" cy="1181517"/>
-          </a:xfrm>
-        </p:spPr>
-        <p:txBody>
-          <a:bodyPr/>
-          <a:lstStyle/>
-          <a:p>
-            <a:r>
-              <a:rPr lang="en-US" dirty="0"/>
-              <a:t>Exploratory Data Analysis</a:t>
-            </a:r>
-          </a:p>
-        </p:txBody>
-      </p:sp>
-      <p:sp>
-        <p:nvSpPr>
-          <p:cNvPr id="3" name="Content Placeholder 2">
-            <a:extLst>
-              <a:ext uri="{FF2B5EF4-FFF2-40B4-BE49-F238E27FC236}">
-                <a16:creationId xmlns:a16="http://schemas.microsoft.com/office/drawing/2014/main" xmlns="" id="{F66CA81D-1701-4C2D-AE08-277C299D9B85}"/>
+                <a16:creationId xmlns="" xmlns:a16="http://schemas.microsoft.com/office/drawing/2014/main" id="{F66CA81D-1701-4C2D-AE08-277C299D9B85}"/>
               </a:ext>
             </a:extLst>
           </p:cNvPr>
@@ -5749,7 +4971,7 @@
           <p:cNvPr id="4" name="Table 5">
             <a:extLst>
               <a:ext uri="{FF2B5EF4-FFF2-40B4-BE49-F238E27FC236}">
-                <a16:creationId xmlns:a16="http://schemas.microsoft.com/office/drawing/2014/main" xmlns="" id="{CDC58BF9-8AD2-4729-BE3A-21FCD6C8C86A}"/>
+                <a16:creationId xmlns="" xmlns:a16="http://schemas.microsoft.com/office/drawing/2014/main" id="{CDC58BF9-8AD2-4729-BE3A-21FCD6C8C86A}"/>
               </a:ext>
             </a:extLst>
           </p:cNvPr>
@@ -5759,7 +4981,7 @@
           <p:nvPr>
             <p:extLst>
               <p:ext uri="{D42A27DB-BD31-4B8C-83A1-F6EECF244321}">
-                <p14:modId xmlns:p14="http://schemas.microsoft.com/office/powerpoint/2010/main" val="3217353778"/>
+                <p14:modId xmlns:p14="http://schemas.microsoft.com/office/powerpoint/2010/main" val="3501673298"/>
               </p:ext>
             </p:extLst>
           </p:nvPr>
@@ -5778,14 +5000,14 @@
                 <a:gridCol w="5191760">
                   <a:extLst>
                     <a:ext uri="{9D8B030D-6E8A-4147-A177-3AD203B41FA5}">
-                      <a16:colId xmlns:a16="http://schemas.microsoft.com/office/drawing/2014/main" xmlns="" val="2919214932"/>
+                      <a16:colId xmlns="" xmlns:a16="http://schemas.microsoft.com/office/drawing/2014/main" val="2919214932"/>
                     </a:ext>
                   </a:extLst>
                 </a:gridCol>
                 <a:gridCol w="5176520">
                   <a:extLst>
                     <a:ext uri="{9D8B030D-6E8A-4147-A177-3AD203B41FA5}">
-                      <a16:colId xmlns:a16="http://schemas.microsoft.com/office/drawing/2014/main" xmlns="" val="3416736214"/>
+                      <a16:colId xmlns="" xmlns:a16="http://schemas.microsoft.com/office/drawing/2014/main" val="3416736214"/>
                     </a:ext>
                   </a:extLst>
                 </a:gridCol>
@@ -5813,7 +5035,7 @@
                 </a:tc>
                 <a:extLst>
                   <a:ext uri="{0D108BD9-81ED-4DB2-BD59-A6C34878D82A}">
-                    <a16:rowId xmlns:a16="http://schemas.microsoft.com/office/drawing/2014/main" xmlns="" val="986129061"/>
+                    <a16:rowId xmlns="" xmlns:a16="http://schemas.microsoft.com/office/drawing/2014/main" val="986129061"/>
                   </a:ext>
                 </a:extLst>
               </a:tr>
@@ -5846,7 +5068,7 @@
                 </a:tc>
                 <a:extLst>
                   <a:ext uri="{0D108BD9-81ED-4DB2-BD59-A6C34878D82A}">
-                    <a16:rowId xmlns:a16="http://schemas.microsoft.com/office/drawing/2014/main" xmlns="" val="2923158457"/>
+                    <a16:rowId xmlns="" xmlns:a16="http://schemas.microsoft.com/office/drawing/2014/main" val="2923158457"/>
                   </a:ext>
                 </a:extLst>
               </a:tr>
@@ -5870,16 +5092,21 @@
                     <a:lstStyle/>
                     <a:p>
                       <a:r>
-                        <a:rPr lang="en-US" dirty="0"/>
-                        <a:t>97600</a:t>
+                        <a:rPr lang="en-US" dirty="0" smtClean="0"/>
+                        <a:t>97600 (using 3,693</a:t>
                       </a:r>
+                      <a:r>
+                        <a:rPr lang="en-US" baseline="0" dirty="0" smtClean="0"/>
+                        <a:t> cases)</a:t>
+                      </a:r>
+                      <a:endParaRPr lang="en-US" dirty="0"/>
                     </a:p>
                   </a:txBody>
                   <a:tcPr/>
                 </a:tc>
                 <a:extLst>
                   <a:ext uri="{0D108BD9-81ED-4DB2-BD59-A6C34878D82A}">
-                    <a16:rowId xmlns:a16="http://schemas.microsoft.com/office/drawing/2014/main" xmlns="" val="2759870889"/>
+                    <a16:rowId xmlns="" xmlns:a16="http://schemas.microsoft.com/office/drawing/2014/main" val="2759870889"/>
                   </a:ext>
                 </a:extLst>
               </a:tr>
@@ -5912,7 +5139,7 @@
                 </a:tc>
                 <a:extLst>
                   <a:ext uri="{0D108BD9-81ED-4DB2-BD59-A6C34878D82A}">
-                    <a16:rowId xmlns:a16="http://schemas.microsoft.com/office/drawing/2014/main" xmlns="" val="1675287206"/>
+                    <a16:rowId xmlns="" xmlns:a16="http://schemas.microsoft.com/office/drawing/2014/main" val="1675287206"/>
                   </a:ext>
                 </a:extLst>
               </a:tr>
@@ -5946,7 +5173,7 @@
                 </a:tc>
                 <a:extLst>
                   <a:ext uri="{0D108BD9-81ED-4DB2-BD59-A6C34878D82A}">
-                    <a16:rowId xmlns:a16="http://schemas.microsoft.com/office/drawing/2014/main" xmlns="" val="2602628322"/>
+                    <a16:rowId xmlns="" xmlns:a16="http://schemas.microsoft.com/office/drawing/2014/main" val="2602628322"/>
                   </a:ext>
                 </a:extLst>
               </a:tr>
@@ -5983,7 +5210,7 @@
                 </a:tc>
                 <a:extLst>
                   <a:ext uri="{0D108BD9-81ED-4DB2-BD59-A6C34878D82A}">
-                    <a16:rowId xmlns:a16="http://schemas.microsoft.com/office/drawing/2014/main" xmlns="" val="1328877814"/>
+                    <a16:rowId xmlns="" xmlns:a16="http://schemas.microsoft.com/office/drawing/2014/main" val="1328877814"/>
                   </a:ext>
                 </a:extLst>
               </a:tr>
@@ -6024,7 +5251,7 @@
                 </a:tc>
                 <a:extLst>
                   <a:ext uri="{0D108BD9-81ED-4DB2-BD59-A6C34878D82A}">
-                    <a16:rowId xmlns:a16="http://schemas.microsoft.com/office/drawing/2014/main" xmlns="" val="3507887961"/>
+                    <a16:rowId xmlns="" xmlns:a16="http://schemas.microsoft.com/office/drawing/2014/main" val="3507887961"/>
                   </a:ext>
                 </a:extLst>
               </a:tr>
@@ -6051,7 +5278,7 @@
                 </a:tc>
                 <a:extLst>
                   <a:ext uri="{0D108BD9-81ED-4DB2-BD59-A6C34878D82A}">
-                    <a16:rowId xmlns:a16="http://schemas.microsoft.com/office/drawing/2014/main" xmlns="" val="3806960762"/>
+                    <a16:rowId xmlns="" xmlns:a16="http://schemas.microsoft.com/office/drawing/2014/main" val="3806960762"/>
                   </a:ext>
                 </a:extLst>
               </a:tr>
@@ -6063,6 +5290,843 @@
     <p:extLst>
       <p:ext uri="{BB962C8B-B14F-4D97-AF65-F5344CB8AC3E}">
         <p14:creationId xmlns:p14="http://schemas.microsoft.com/office/powerpoint/2010/main" val="1243778701"/>
+      </p:ext>
+    </p:extLst>
+  </p:cSld>
+  <p:clrMapOvr>
+    <a:masterClrMapping/>
+  </p:clrMapOvr>
+</p:sld>
+</file>
+
+<file path=ppt/slides/slide4.xml><?xml version="1.0" encoding="utf-8"?>
+<p:sld xmlns:a="http://schemas.openxmlformats.org/drawingml/2006/main" xmlns:r="http://schemas.openxmlformats.org/officeDocument/2006/relationships" xmlns:p="http://schemas.openxmlformats.org/presentationml/2006/main">
+  <p:cSld>
+    <p:spTree>
+      <p:nvGrpSpPr>
+        <p:cNvPr id="1" name=""/>
+        <p:cNvGrpSpPr/>
+        <p:nvPr/>
+      </p:nvGrpSpPr>
+      <p:grpSpPr>
+        <a:xfrm>
+          <a:off x="0" y="0"/>
+          <a:ext cx="0" cy="0"/>
+          <a:chOff x="0" y="0"/>
+          <a:chExt cx="0" cy="0"/>
+        </a:xfrm>
+      </p:grpSpPr>
+      <p:sp>
+        <p:nvSpPr>
+          <p:cNvPr id="2" name="Title 1">
+            <a:extLst>
+              <a:ext uri="{FF2B5EF4-FFF2-40B4-BE49-F238E27FC236}">
+                <a16:creationId xmlns="" xmlns:a16="http://schemas.microsoft.com/office/drawing/2014/main" id="{CA344CBA-FB2B-44A2-9612-01FA04D41200}"/>
+              </a:ext>
+            </a:extLst>
+          </p:cNvPr>
+          <p:cNvSpPr>
+            <a:spLocks noGrp="1"/>
+          </p:cNvSpPr>
+          <p:nvPr>
+            <p:ph type="title"/>
+          </p:nvPr>
+        </p:nvSpPr>
+        <p:spPr>
+          <a:xfrm>
+            <a:off x="1097280" y="286603"/>
+            <a:ext cx="10058400" cy="1181517"/>
+          </a:xfrm>
+        </p:spPr>
+        <p:txBody>
+          <a:bodyPr/>
+          <a:lstStyle/>
+          <a:p>
+            <a:r>
+              <a:rPr lang="en-US" dirty="0"/>
+              <a:t>Exploratory Data Analysis</a:t>
+            </a:r>
+          </a:p>
+        </p:txBody>
+      </p:sp>
+      <p:sp>
+        <p:nvSpPr>
+          <p:cNvPr id="3" name="Content Placeholder 2">
+            <a:extLst>
+              <a:ext uri="{FF2B5EF4-FFF2-40B4-BE49-F238E27FC236}">
+                <a16:creationId xmlns="" xmlns:a16="http://schemas.microsoft.com/office/drawing/2014/main" id="{F66CA81D-1701-4C2D-AE08-277C299D9B85}"/>
+              </a:ext>
+            </a:extLst>
+          </p:cNvPr>
+          <p:cNvSpPr>
+            <a:spLocks noGrp="1"/>
+          </p:cNvSpPr>
+          <p:nvPr>
+            <p:ph idx="1"/>
+          </p:nvPr>
+        </p:nvSpPr>
+        <p:spPr>
+          <a:xfrm>
+            <a:off x="365760" y="1955800"/>
+            <a:ext cx="11394440" cy="4378959"/>
+          </a:xfrm>
+        </p:spPr>
+        <p:txBody>
+          <a:bodyPr>
+            <a:normAutofit/>
+          </a:bodyPr>
+          <a:lstStyle/>
+          <a:p>
+            <a:pPr marL="0" indent="0">
+              <a:buNone/>
+            </a:pPr>
+            <a:endParaRPr lang="en-US" sz="2400" dirty="0"/>
+          </a:p>
+          <a:p>
+            <a:pPr marL="0" indent="0">
+              <a:buNone/>
+            </a:pPr>
+            <a:endParaRPr lang="en-US" sz="2400" dirty="0"/>
+          </a:p>
+          <a:p>
+            <a:pPr marL="0" indent="0">
+              <a:buNone/>
+            </a:pPr>
+            <a:r>
+              <a:rPr lang="en-US" sz="2500" dirty="0"/>
+              <a:t> </a:t>
+            </a:r>
+          </a:p>
+        </p:txBody>
+      </p:sp>
+      <p:pic>
+        <p:nvPicPr>
+          <p:cNvPr id="5" name="Picture 4">
+            <a:extLst>
+              <a:ext uri="{FF2B5EF4-FFF2-40B4-BE49-F238E27FC236}">
+                <a16:creationId xmlns="" xmlns:a16="http://schemas.microsoft.com/office/drawing/2014/main" id="{EC9799C3-2B3D-4E11-B8E0-90B04A451CE9}"/>
+              </a:ext>
+            </a:extLst>
+          </p:cNvPr>
+          <p:cNvPicPr>
+            <a:picLocks noChangeAspect="1"/>
+          </p:cNvPicPr>
+          <p:nvPr/>
+        </p:nvPicPr>
+        <p:blipFill>
+          <a:blip r:embed="rId2"/>
+          <a:stretch>
+            <a:fillRect/>
+          </a:stretch>
+        </p:blipFill>
+        <p:spPr>
+          <a:xfrm>
+            <a:off x="880427" y="2266731"/>
+            <a:ext cx="3295333" cy="2142709"/>
+          </a:xfrm>
+          <a:prstGeom prst="rect">
+            <a:avLst/>
+          </a:prstGeom>
+        </p:spPr>
+      </p:pic>
+      <p:sp>
+        <p:nvSpPr>
+          <p:cNvPr id="6" name="TextBox 5">
+            <a:extLst>
+              <a:ext uri="{FF2B5EF4-FFF2-40B4-BE49-F238E27FC236}">
+                <a16:creationId xmlns="" xmlns:a16="http://schemas.microsoft.com/office/drawing/2014/main" id="{D18CB254-BC4E-464E-8235-486086BBF8F6}"/>
+              </a:ext>
+            </a:extLst>
+          </p:cNvPr>
+          <p:cNvSpPr txBox="1"/>
+          <p:nvPr/>
+        </p:nvSpPr>
+        <p:spPr>
+          <a:xfrm>
+            <a:off x="1097280" y="2020510"/>
+            <a:ext cx="1657826" cy="261610"/>
+          </a:xfrm>
+          <a:prstGeom prst="rect">
+            <a:avLst/>
+          </a:prstGeom>
+          <a:noFill/>
+        </p:spPr>
+        <p:txBody>
+          <a:bodyPr wrap="none" rtlCol="0">
+            <a:spAutoFit/>
+          </a:bodyPr>
+          <a:lstStyle/>
+          <a:p>
+            <a:r>
+              <a:rPr lang="en-US" sz="1100" b="1" dirty="0"/>
+              <a:t>Number of cases by year</a:t>
+            </a:r>
+          </a:p>
+        </p:txBody>
+      </p:sp>
+    </p:spTree>
+    <p:extLst>
+      <p:ext uri="{BB962C8B-B14F-4D97-AF65-F5344CB8AC3E}">
+        <p14:creationId xmlns:p14="http://schemas.microsoft.com/office/powerpoint/2010/main" val="2751634165"/>
+      </p:ext>
+    </p:extLst>
+  </p:cSld>
+  <p:clrMapOvr>
+    <a:masterClrMapping/>
+  </p:clrMapOvr>
+</p:sld>
+</file>
+
+<file path=ppt/slides/slide5.xml><?xml version="1.0" encoding="utf-8"?>
+<p:sld xmlns:a="http://schemas.openxmlformats.org/drawingml/2006/main" xmlns:r="http://schemas.openxmlformats.org/officeDocument/2006/relationships" xmlns:p="http://schemas.openxmlformats.org/presentationml/2006/main">
+  <p:cSld>
+    <p:spTree>
+      <p:nvGrpSpPr>
+        <p:cNvPr id="1" name=""/>
+        <p:cNvGrpSpPr/>
+        <p:nvPr/>
+      </p:nvGrpSpPr>
+      <p:grpSpPr>
+        <a:xfrm>
+          <a:off x="0" y="0"/>
+          <a:ext cx="0" cy="0"/>
+          <a:chOff x="0" y="0"/>
+          <a:chExt cx="0" cy="0"/>
+        </a:xfrm>
+      </p:grpSpPr>
+      <p:sp>
+        <p:nvSpPr>
+          <p:cNvPr id="2" name="Title 1">
+            <a:extLst>
+              <a:ext uri="{FF2B5EF4-FFF2-40B4-BE49-F238E27FC236}">
+                <a16:creationId xmlns="" xmlns:a16="http://schemas.microsoft.com/office/drawing/2014/main" id="{CA344CBA-FB2B-44A2-9612-01FA04D41200}"/>
+              </a:ext>
+            </a:extLst>
+          </p:cNvPr>
+          <p:cNvSpPr>
+            <a:spLocks noGrp="1"/>
+          </p:cNvSpPr>
+          <p:nvPr>
+            <p:ph type="title"/>
+          </p:nvPr>
+        </p:nvSpPr>
+        <p:spPr>
+          <a:xfrm>
+            <a:off x="1097280" y="286603"/>
+            <a:ext cx="10058400" cy="1181517"/>
+          </a:xfrm>
+        </p:spPr>
+        <p:txBody>
+          <a:bodyPr/>
+          <a:lstStyle/>
+          <a:p>
+            <a:r>
+              <a:rPr lang="en-US" dirty="0"/>
+              <a:t>Preparing the data</a:t>
+            </a:r>
+          </a:p>
+        </p:txBody>
+      </p:sp>
+      <p:sp>
+        <p:nvSpPr>
+          <p:cNvPr id="3" name="Content Placeholder 2">
+            <a:extLst>
+              <a:ext uri="{FF2B5EF4-FFF2-40B4-BE49-F238E27FC236}">
+                <a16:creationId xmlns="" xmlns:a16="http://schemas.microsoft.com/office/drawing/2014/main" id="{F66CA81D-1701-4C2D-AE08-277C299D9B85}"/>
+              </a:ext>
+            </a:extLst>
+          </p:cNvPr>
+          <p:cNvSpPr>
+            <a:spLocks noGrp="1"/>
+          </p:cNvSpPr>
+          <p:nvPr>
+            <p:ph idx="1"/>
+          </p:nvPr>
+        </p:nvSpPr>
+        <p:spPr>
+          <a:xfrm>
+            <a:off x="365760" y="1955800"/>
+            <a:ext cx="10896600" cy="4378959"/>
+          </a:xfrm>
+        </p:spPr>
+        <p:txBody>
+          <a:bodyPr>
+            <a:normAutofit/>
+          </a:bodyPr>
+          <a:lstStyle/>
+          <a:p>
+            <a:pPr marL="0" indent="0">
+              <a:buNone/>
+            </a:pPr>
+            <a:r>
+              <a:rPr lang="en-US" sz="2500" dirty="0"/>
+              <a:t>The steps to prepare the data for our models:</a:t>
+            </a:r>
+          </a:p>
+          <a:p>
+            <a:pPr marL="457200" indent="-457200">
+              <a:buAutoNum type="arabicParenR"/>
+            </a:pPr>
+            <a:r>
+              <a:rPr lang="en-US" sz="2000" dirty="0" smtClean="0"/>
+              <a:t>Selected cases since 2008</a:t>
+            </a:r>
+            <a:endParaRPr lang="en-US" sz="2000" dirty="0"/>
+          </a:p>
+          <a:p>
+            <a:pPr marL="457200" indent="-457200">
+              <a:buAutoNum type="arabicParenR"/>
+            </a:pPr>
+            <a:r>
+              <a:rPr lang="en-US" sz="2000" dirty="0" smtClean="0"/>
+              <a:t>Extract majority </a:t>
+            </a:r>
+            <a:r>
+              <a:rPr lang="en-US" sz="2000" dirty="0"/>
+              <a:t>opinion </a:t>
+            </a:r>
+            <a:r>
+              <a:rPr lang="en-US" sz="2000" dirty="0" smtClean="0"/>
+              <a:t>and </a:t>
+            </a:r>
+            <a:r>
+              <a:rPr lang="en-US" sz="2000" dirty="0" smtClean="0"/>
+              <a:t>headnotes </a:t>
+            </a:r>
+            <a:r>
+              <a:rPr lang="en-US" sz="2000" dirty="0"/>
+              <a:t>from </a:t>
+            </a:r>
+            <a:r>
+              <a:rPr lang="en-US" sz="2000" dirty="0" err="1"/>
+              <a:t>casebody.data</a:t>
+            </a:r>
+            <a:endParaRPr lang="en-US" sz="2000" dirty="0"/>
+          </a:p>
+          <a:p>
+            <a:pPr marL="457200" indent="-457200">
+              <a:buAutoNum type="arabicParenR"/>
+            </a:pPr>
+            <a:r>
+              <a:rPr lang="en-US" sz="2000" dirty="0" smtClean="0"/>
+              <a:t>Removed ‘\n’ from </a:t>
+            </a:r>
+            <a:r>
+              <a:rPr lang="en-US" sz="2000" smtClean="0"/>
+              <a:t>the opinions</a:t>
+            </a:r>
+            <a:endParaRPr lang="en-US" sz="2000" dirty="0"/>
+          </a:p>
+          <a:p>
+            <a:pPr marL="457200" indent="-457200">
+              <a:buAutoNum type="arabicParenR"/>
+            </a:pPr>
+            <a:r>
+              <a:rPr lang="en-US" sz="2000" dirty="0"/>
+              <a:t>Save data where length of headnotes &gt; 150 and opinion is larger than the headnotes</a:t>
+            </a:r>
+          </a:p>
+          <a:p>
+            <a:pPr marL="457200" indent="-457200">
+              <a:buAutoNum type="arabicParenR"/>
+            </a:pPr>
+            <a:r>
+              <a:rPr lang="en-US" sz="2000" dirty="0"/>
+              <a:t>Tokenize the headnotes and opinions</a:t>
+            </a:r>
+          </a:p>
+          <a:p>
+            <a:pPr marL="457200" indent="-457200">
+              <a:buAutoNum type="arabicParenR"/>
+            </a:pPr>
+            <a:r>
+              <a:rPr lang="en-US" sz="2000" dirty="0"/>
+              <a:t>Preprocess using Bert preprocessor to label opinions. </a:t>
+            </a:r>
+          </a:p>
+          <a:p>
+            <a:pPr marL="457200" indent="-457200">
+              <a:buAutoNum type="arabicParenR"/>
+            </a:pPr>
+            <a:r>
+              <a:rPr lang="en-US" sz="2000" dirty="0"/>
+              <a:t>Split data into training testing and validation sets</a:t>
+            </a:r>
+          </a:p>
+        </p:txBody>
+      </p:sp>
+    </p:spTree>
+    <p:extLst>
+      <p:ext uri="{BB962C8B-B14F-4D97-AF65-F5344CB8AC3E}">
+        <p14:creationId xmlns:p14="http://schemas.microsoft.com/office/powerpoint/2010/main" val="1791440519"/>
+      </p:ext>
+    </p:extLst>
+  </p:cSld>
+  <p:clrMapOvr>
+    <a:masterClrMapping/>
+  </p:clrMapOvr>
+</p:sld>
+</file>
+
+<file path=ppt/slides/slide6.xml><?xml version="1.0" encoding="utf-8"?>
+<p:sld xmlns:a="http://schemas.openxmlformats.org/drawingml/2006/main" xmlns:r="http://schemas.openxmlformats.org/officeDocument/2006/relationships" xmlns:p="http://schemas.openxmlformats.org/presentationml/2006/main">
+  <p:cSld>
+    <p:spTree>
+      <p:nvGrpSpPr>
+        <p:cNvPr id="1" name=""/>
+        <p:cNvGrpSpPr/>
+        <p:nvPr/>
+      </p:nvGrpSpPr>
+      <p:grpSpPr>
+        <a:xfrm>
+          <a:off x="0" y="0"/>
+          <a:ext cx="0" cy="0"/>
+          <a:chOff x="0" y="0"/>
+          <a:chExt cx="0" cy="0"/>
+        </a:xfrm>
+      </p:grpSpPr>
+      <p:sp>
+        <p:nvSpPr>
+          <p:cNvPr id="2" name="Title 1">
+            <a:extLst>
+              <a:ext uri="{FF2B5EF4-FFF2-40B4-BE49-F238E27FC236}">
+                <a16:creationId xmlns="" xmlns:a16="http://schemas.microsoft.com/office/drawing/2014/main" id="{CA344CBA-FB2B-44A2-9612-01FA04D41200}"/>
+              </a:ext>
+            </a:extLst>
+          </p:cNvPr>
+          <p:cNvSpPr>
+            <a:spLocks noGrp="1"/>
+          </p:cNvSpPr>
+          <p:nvPr>
+            <p:ph type="title"/>
+          </p:nvPr>
+        </p:nvSpPr>
+        <p:spPr>
+          <a:xfrm>
+            <a:off x="1097280" y="286603"/>
+            <a:ext cx="10058400" cy="1181517"/>
+          </a:xfrm>
+        </p:spPr>
+        <p:txBody>
+          <a:bodyPr/>
+          <a:lstStyle/>
+          <a:p>
+            <a:r>
+              <a:rPr lang="en-US" dirty="0"/>
+              <a:t>Steps for labeling data</a:t>
+            </a:r>
+          </a:p>
+        </p:txBody>
+      </p:sp>
+      <p:sp>
+        <p:nvSpPr>
+          <p:cNvPr id="3" name="Content Placeholder 2">
+            <a:extLst>
+              <a:ext uri="{FF2B5EF4-FFF2-40B4-BE49-F238E27FC236}">
+                <a16:creationId xmlns="" xmlns:a16="http://schemas.microsoft.com/office/drawing/2014/main" id="{F66CA81D-1701-4C2D-AE08-277C299D9B85}"/>
+              </a:ext>
+            </a:extLst>
+          </p:cNvPr>
+          <p:cNvSpPr>
+            <a:spLocks noGrp="1"/>
+          </p:cNvSpPr>
+          <p:nvPr>
+            <p:ph idx="1"/>
+          </p:nvPr>
+        </p:nvSpPr>
+        <p:spPr>
+          <a:xfrm>
+            <a:off x="365760" y="1955800"/>
+            <a:ext cx="10896600" cy="4378959"/>
+          </a:xfrm>
+        </p:spPr>
+        <p:txBody>
+          <a:bodyPr>
+            <a:normAutofit/>
+          </a:bodyPr>
+          <a:lstStyle/>
+          <a:p>
+            <a:pPr marL="0" indent="0">
+              <a:buNone/>
+            </a:pPr>
+            <a:r>
+              <a:rPr lang="en-US" sz="1800" dirty="0"/>
+              <a:t>The steps to prepare the data for our models:</a:t>
+            </a:r>
+          </a:p>
+          <a:p>
+            <a:pPr marL="457200" indent="-457200">
+              <a:buAutoNum type="arabicParenR"/>
+            </a:pPr>
+            <a:r>
+              <a:rPr lang="en-US" sz="1800" dirty="0"/>
+              <a:t>For each sentence in opinion and compare it to the sentences in the headnotes. </a:t>
+            </a:r>
+          </a:p>
+          <a:p>
+            <a:pPr marL="457200" indent="-457200">
+              <a:buAutoNum type="arabicParenR"/>
+            </a:pPr>
+            <a:r>
+              <a:rPr lang="en-US" sz="1800" dirty="0"/>
+              <a:t>If the sentence increases the rouge score, select the sentence for the summary. </a:t>
+            </a:r>
+          </a:p>
+          <a:p>
+            <a:pPr marL="457200" indent="-457200">
+              <a:buAutoNum type="arabicParenR"/>
+            </a:pPr>
+            <a:r>
+              <a:rPr lang="en-US" sz="1800" dirty="0"/>
+              <a:t>Label the tokenized opinion so that the sentences that are selected have a label of 1 and the sentence that is not selected has a label of 0</a:t>
+            </a:r>
+          </a:p>
+          <a:p>
+            <a:pPr marL="457200" indent="-457200">
+              <a:buAutoNum type="arabicParenR"/>
+            </a:pPr>
+            <a:r>
+              <a:rPr lang="en-US" sz="1800" dirty="0"/>
+              <a:t>Additional columns created are for each opinion</a:t>
+            </a:r>
+          </a:p>
+          <a:p>
+            <a:pPr marL="749808" lvl="1" indent="-457200">
+              <a:buFont typeface="Arial" panose="020B0604020202020204" pitchFamily="34" charset="0"/>
+              <a:buChar char="•"/>
+            </a:pPr>
+            <a:r>
+              <a:rPr lang="en-US" sz="1400" dirty="0"/>
+              <a:t>The starting index of each sentence</a:t>
+            </a:r>
+          </a:p>
+          <a:p>
+            <a:pPr marL="749808" lvl="1" indent="-457200">
+              <a:buFont typeface="Arial" panose="020B0604020202020204" pitchFamily="34" charset="0"/>
+              <a:buChar char="•"/>
+            </a:pPr>
+            <a:r>
+              <a:rPr lang="en-US" sz="1400" dirty="0"/>
+              <a:t>The rank of each word in an opinion</a:t>
+            </a:r>
+          </a:p>
+          <a:p>
+            <a:pPr marL="749808" lvl="1" indent="-457200">
+              <a:buFont typeface="Arial" panose="020B0604020202020204" pitchFamily="34" charset="0"/>
+              <a:buChar char="•"/>
+            </a:pPr>
+            <a:endParaRPr lang="en-US" sz="1400" dirty="0"/>
+          </a:p>
+          <a:p>
+            <a:pPr marL="749808" lvl="1" indent="-457200">
+              <a:buFont typeface="Arial" panose="020B0604020202020204" pitchFamily="34" charset="0"/>
+              <a:buChar char="•"/>
+            </a:pPr>
+            <a:endParaRPr lang="en-US" sz="1400" dirty="0"/>
+          </a:p>
+          <a:p>
+            <a:pPr marL="457200" indent="-457200">
+              <a:buAutoNum type="arabicParenR"/>
+            </a:pPr>
+            <a:endParaRPr lang="en-US" sz="1600" dirty="0"/>
+          </a:p>
+          <a:p>
+            <a:pPr marL="457200" indent="-457200">
+              <a:buAutoNum type="arabicParenR"/>
+            </a:pPr>
+            <a:endParaRPr lang="en-US" sz="2500" dirty="0"/>
+          </a:p>
+          <a:p>
+            <a:pPr marL="457200" indent="-457200">
+              <a:buAutoNum type="arabicParenR"/>
+            </a:pPr>
+            <a:endParaRPr lang="en-US" sz="2500" dirty="0"/>
+          </a:p>
+        </p:txBody>
+      </p:sp>
+    </p:spTree>
+    <p:extLst>
+      <p:ext uri="{BB962C8B-B14F-4D97-AF65-F5344CB8AC3E}">
+        <p14:creationId xmlns:p14="http://schemas.microsoft.com/office/powerpoint/2010/main" val="407012818"/>
+      </p:ext>
+    </p:extLst>
+  </p:cSld>
+  <p:clrMapOvr>
+    <a:masterClrMapping/>
+  </p:clrMapOvr>
+</p:sld>
+</file>
+
+<file path=ppt/slides/slide7.xml><?xml version="1.0" encoding="utf-8"?>
+<p:sld xmlns:a="http://schemas.openxmlformats.org/drawingml/2006/main" xmlns:r="http://schemas.openxmlformats.org/officeDocument/2006/relationships" xmlns:p="http://schemas.openxmlformats.org/presentationml/2006/main">
+  <p:cSld>
+    <p:spTree>
+      <p:nvGrpSpPr>
+        <p:cNvPr id="1" name=""/>
+        <p:cNvGrpSpPr/>
+        <p:nvPr/>
+      </p:nvGrpSpPr>
+      <p:grpSpPr>
+        <a:xfrm>
+          <a:off x="0" y="0"/>
+          <a:ext cx="0" cy="0"/>
+          <a:chOff x="0" y="0"/>
+          <a:chExt cx="0" cy="0"/>
+        </a:xfrm>
+      </p:grpSpPr>
+      <p:sp>
+        <p:nvSpPr>
+          <p:cNvPr id="2" name="Title 1">
+            <a:extLst>
+              <a:ext uri="{FF2B5EF4-FFF2-40B4-BE49-F238E27FC236}">
+                <a16:creationId xmlns="" xmlns:a16="http://schemas.microsoft.com/office/drawing/2014/main" id="{CA344CBA-FB2B-44A2-9612-01FA04D41200}"/>
+              </a:ext>
+            </a:extLst>
+          </p:cNvPr>
+          <p:cNvSpPr>
+            <a:spLocks noGrp="1"/>
+          </p:cNvSpPr>
+          <p:nvPr>
+            <p:ph type="title"/>
+          </p:nvPr>
+        </p:nvSpPr>
+        <p:spPr/>
+        <p:txBody>
+          <a:bodyPr/>
+          <a:lstStyle/>
+          <a:p>
+            <a:r>
+              <a:rPr lang="en-US" dirty="0"/>
+              <a:t>Types of Summarizations</a:t>
+            </a:r>
+          </a:p>
+        </p:txBody>
+      </p:sp>
+      <p:sp>
+        <p:nvSpPr>
+          <p:cNvPr id="3" name="Content Placeholder 2">
+            <a:extLst>
+              <a:ext uri="{FF2B5EF4-FFF2-40B4-BE49-F238E27FC236}">
+                <a16:creationId xmlns="" xmlns:a16="http://schemas.microsoft.com/office/drawing/2014/main" id="{F66CA81D-1701-4C2D-AE08-277C299D9B85}"/>
+              </a:ext>
+            </a:extLst>
+          </p:cNvPr>
+          <p:cNvSpPr>
+            <a:spLocks noGrp="1"/>
+          </p:cNvSpPr>
+          <p:nvPr>
+            <p:ph idx="1"/>
+          </p:nvPr>
+        </p:nvSpPr>
+        <p:spPr/>
+        <p:txBody>
+          <a:bodyPr>
+            <a:normAutofit/>
+          </a:bodyPr>
+          <a:lstStyle/>
+          <a:p>
+            <a:pPr lvl="0"/>
+            <a:r>
+              <a:rPr lang="en-US" b="1" dirty="0"/>
+              <a:t>Extraction-based summarization</a:t>
+            </a:r>
+            <a:r>
+              <a:rPr lang="en-US" dirty="0"/>
+              <a:t>: Content is extracted from original document and is not modified. This method will extract key phrases or sentences to form a summary. The summary generated by this method may not be the same format as a human might express  it and the sentences may appear disjointed</a:t>
+            </a:r>
+          </a:p>
+          <a:p>
+            <a:pPr lvl="0"/>
+            <a:r>
+              <a:rPr lang="en-US" b="1" dirty="0"/>
+              <a:t>Abstraction-based summarization</a:t>
+            </a:r>
+            <a:r>
+              <a:rPr lang="en-US" dirty="0"/>
+              <a:t>: Abstractive methods generate a summary based on internal semantic representation of the original content, closer to what a human might express. Abstraction may transform the extracted content. Such transformation are computationally very challenging  , involving both NLP (natural language processing) and a deep understanding of the document </a:t>
+            </a:r>
+          </a:p>
+          <a:p>
+            <a:pPr marL="457200" indent="-457200">
+              <a:buAutoNum type="arabicParenR"/>
+            </a:pPr>
+            <a:endParaRPr lang="en-US" dirty="0"/>
+          </a:p>
+        </p:txBody>
+      </p:sp>
+    </p:spTree>
+    <p:extLst>
+      <p:ext uri="{BB962C8B-B14F-4D97-AF65-F5344CB8AC3E}">
+        <p14:creationId xmlns:p14="http://schemas.microsoft.com/office/powerpoint/2010/main" val="1897433995"/>
+      </p:ext>
+    </p:extLst>
+  </p:cSld>
+  <p:clrMapOvr>
+    <a:masterClrMapping/>
+  </p:clrMapOvr>
+</p:sld>
+</file>
+
+<file path=ppt/slides/slide8.xml><?xml version="1.0" encoding="utf-8"?>
+<p:sld xmlns:a="http://schemas.openxmlformats.org/drawingml/2006/main" xmlns:r="http://schemas.openxmlformats.org/officeDocument/2006/relationships" xmlns:p="http://schemas.openxmlformats.org/presentationml/2006/main">
+  <p:cSld>
+    <p:spTree>
+      <p:nvGrpSpPr>
+        <p:cNvPr id="1" name=""/>
+        <p:cNvGrpSpPr/>
+        <p:nvPr/>
+      </p:nvGrpSpPr>
+      <p:grpSpPr>
+        <a:xfrm>
+          <a:off x="0" y="0"/>
+          <a:ext cx="0" cy="0"/>
+          <a:chOff x="0" y="0"/>
+          <a:chExt cx="0" cy="0"/>
+        </a:xfrm>
+      </p:grpSpPr>
+      <p:sp>
+        <p:nvSpPr>
+          <p:cNvPr id="2" name="Title 1">
+            <a:extLst>
+              <a:ext uri="{FF2B5EF4-FFF2-40B4-BE49-F238E27FC236}">
+                <a16:creationId xmlns="" xmlns:a16="http://schemas.microsoft.com/office/drawing/2014/main" id="{CA344CBA-FB2B-44A2-9612-01FA04D41200}"/>
+              </a:ext>
+            </a:extLst>
+          </p:cNvPr>
+          <p:cNvSpPr>
+            <a:spLocks noGrp="1"/>
+          </p:cNvSpPr>
+          <p:nvPr>
+            <p:ph type="title"/>
+          </p:nvPr>
+        </p:nvSpPr>
+        <p:spPr/>
+        <p:txBody>
+          <a:bodyPr/>
+          <a:lstStyle/>
+          <a:p>
+            <a:r>
+              <a:rPr lang="en-US"/>
+              <a:t>Our Research</a:t>
+            </a:r>
+            <a:endParaRPr lang="en-US" dirty="0"/>
+          </a:p>
+        </p:txBody>
+      </p:sp>
+      <p:sp>
+        <p:nvSpPr>
+          <p:cNvPr id="3" name="Content Placeholder 2">
+            <a:extLst>
+              <a:ext uri="{FF2B5EF4-FFF2-40B4-BE49-F238E27FC236}">
+                <a16:creationId xmlns="" xmlns:a16="http://schemas.microsoft.com/office/drawing/2014/main" id="{F66CA81D-1701-4C2D-AE08-277C299D9B85}"/>
+              </a:ext>
+            </a:extLst>
+          </p:cNvPr>
+          <p:cNvSpPr>
+            <a:spLocks noGrp="1"/>
+          </p:cNvSpPr>
+          <p:nvPr>
+            <p:ph idx="1"/>
+          </p:nvPr>
+        </p:nvSpPr>
+        <p:spPr/>
+        <p:txBody>
+          <a:bodyPr>
+            <a:normAutofit/>
+          </a:bodyPr>
+          <a:lstStyle/>
+          <a:p>
+            <a:pPr marL="0" indent="0">
+              <a:buNone/>
+            </a:pPr>
+            <a:r>
+              <a:rPr lang="en-US" sz="2000" dirty="0"/>
+              <a:t>We searched for existing models that generate summaries based on the following criteria</a:t>
+            </a:r>
+            <a:endParaRPr lang="en-US" sz="4800" dirty="0"/>
+          </a:p>
+          <a:p>
+            <a:pPr>
+              <a:buFont typeface="Wingdings" panose="05000000000000000000" pitchFamily="2" charset="2"/>
+              <a:buChar char="§"/>
+            </a:pPr>
+            <a:r>
+              <a:rPr lang="en-US" dirty="0"/>
+              <a:t>Generate Extractive summaries since they can generate semantically and grammatically correct sentences these models need less resources and understanding of the domain.</a:t>
+            </a:r>
+          </a:p>
+          <a:p>
+            <a:pPr>
+              <a:buFont typeface="Wingdings" panose="05000000000000000000" pitchFamily="2" charset="2"/>
+              <a:buChar char="§"/>
+            </a:pPr>
+            <a:r>
+              <a:rPr lang="en-US" dirty="0"/>
+              <a:t>Summarize  long documents </a:t>
+            </a:r>
+          </a:p>
+          <a:p>
+            <a:pPr>
+              <a:buFont typeface="Wingdings" panose="05000000000000000000" pitchFamily="2" charset="2"/>
+              <a:buChar char="§"/>
+            </a:pPr>
+            <a:r>
+              <a:rPr lang="en-US" dirty="0"/>
+              <a:t>Perform well as measured by the </a:t>
+            </a:r>
+            <a:r>
+              <a:rPr lang="en-US" b="1" dirty="0"/>
+              <a:t>ROGUE</a:t>
+            </a:r>
+            <a:r>
+              <a:rPr lang="en-US" dirty="0"/>
+              <a:t> (</a:t>
+            </a:r>
+            <a:r>
+              <a:rPr lang="en-US" b="1" dirty="0"/>
+              <a:t>Recall-Oriented Understudy for </a:t>
+            </a:r>
+            <a:r>
+              <a:rPr lang="en-US" b="1" dirty="0" err="1"/>
+              <a:t>Gisting</a:t>
+            </a:r>
+            <a:r>
+              <a:rPr lang="en-US" b="1" dirty="0"/>
+              <a:t> Evaluation) Metric</a:t>
+            </a:r>
+            <a:r>
+              <a:rPr lang="en-US" dirty="0"/>
+              <a:t> Score. </a:t>
+            </a:r>
+          </a:p>
+          <a:p>
+            <a:pPr>
+              <a:buFont typeface="Wingdings" panose="05000000000000000000" pitchFamily="2" charset="2"/>
+              <a:buChar char="§"/>
+            </a:pPr>
+            <a:r>
+              <a:rPr lang="en-US" dirty="0"/>
+              <a:t>Can be implemented in the given time constraint</a:t>
+            </a:r>
+          </a:p>
+          <a:p>
+            <a:pPr marL="457200" indent="-457200">
+              <a:buAutoNum type="arabicParenR" startAt="3"/>
+            </a:pPr>
+            <a:endParaRPr lang="en-US" dirty="0"/>
+          </a:p>
+          <a:p>
+            <a:pPr marL="457200" indent="-457200">
+              <a:buAutoNum type="arabicParenR"/>
+            </a:pPr>
+            <a:endParaRPr lang="en-US" dirty="0"/>
+          </a:p>
+        </p:txBody>
+      </p:sp>
+    </p:spTree>
+    <p:extLst>
+      <p:ext uri="{BB962C8B-B14F-4D97-AF65-F5344CB8AC3E}">
+        <p14:creationId xmlns:p14="http://schemas.microsoft.com/office/powerpoint/2010/main" val="2529450920"/>
       </p:ext>
     </p:extLst>
   </p:cSld>
@@ -6094,7 +6158,7 @@
           <p:cNvPr id="2" name="Title 1">
             <a:extLst>
               <a:ext uri="{FF2B5EF4-FFF2-40B4-BE49-F238E27FC236}">
-                <a16:creationId xmlns:a16="http://schemas.microsoft.com/office/drawing/2014/main" xmlns="" id="{CA344CBA-FB2B-44A2-9612-01FA04D41200}"/>
+                <a16:creationId xmlns="" xmlns:a16="http://schemas.microsoft.com/office/drawing/2014/main" id="{CA344CBA-FB2B-44A2-9612-01FA04D41200}"/>
               </a:ext>
             </a:extLst>
           </p:cNvPr>
@@ -6117,7 +6181,7 @@
           <a:p>
             <a:r>
               <a:rPr lang="en-US" dirty="0"/>
-              <a:t>Exploratory Data Analysis</a:t>
+              <a:t>Our Research</a:t>
             </a:r>
           </a:p>
         </p:txBody>
@@ -6127,7 +6191,7 @@
           <p:cNvPr id="3" name="Content Placeholder 2">
             <a:extLst>
               <a:ext uri="{FF2B5EF4-FFF2-40B4-BE49-F238E27FC236}">
-                <a16:creationId xmlns:a16="http://schemas.microsoft.com/office/drawing/2014/main" xmlns="" id="{F66CA81D-1701-4C2D-AE08-277C299D9B85}"/>
+                <a16:creationId xmlns="" xmlns:a16="http://schemas.microsoft.com/office/drawing/2014/main" id="{F66CA81D-1701-4C2D-AE08-277C299D9B85}"/>
               </a:ext>
             </a:extLst>
           </p:cNvPr>
@@ -6141,7 +6205,7 @@
         <p:spPr>
           <a:xfrm>
             <a:off x="365760" y="1955800"/>
-            <a:ext cx="11394440" cy="4378959"/>
+            <a:ext cx="10789920" cy="4378959"/>
           </a:xfrm>
         </p:spPr>
         <p:txBody>
@@ -6153,86 +6217,49 @@
             <a:pPr marL="0" indent="0">
               <a:buNone/>
             </a:pPr>
-            <a:endParaRPr lang="en-US" sz="2400" dirty="0"/>
+            <a:r>
+              <a:rPr lang="en-US" sz="2500" dirty="0"/>
+              <a:t>The models we researched are</a:t>
+            </a:r>
           </a:p>
           <a:p>
             <a:pPr marL="0" indent="0">
               <a:buNone/>
             </a:pPr>
-            <a:endParaRPr lang="en-US" sz="2400" dirty="0"/>
+            <a:r>
+              <a:rPr lang="en-US" dirty="0">
+                <a:hlinkClick r:id="rId2"/>
+              </a:rPr>
+              <a:t>Text Summarization with Pretrained Encoders</a:t>
+            </a:r>
+            <a:r>
+              <a:rPr lang="en-US" sz="2500" dirty="0"/>
+              <a:t>: </a:t>
+            </a:r>
+            <a:r>
+              <a:rPr lang="en-US" dirty="0"/>
+              <a:t>Bidirectional Encoder Representations from Transformers (BERT; Devlin et al. 2019) represents a pretrained language models which have recently advanced a wide range of natural language processing tasks. </a:t>
+            </a:r>
           </a:p>
           <a:p>
             <a:pPr marL="0" indent="0">
               <a:buNone/>
             </a:pPr>
             <a:r>
-              <a:rPr lang="en-US" sz="2500" dirty="0"/>
-              <a:t> </a:t>
-            </a:r>
-          </a:p>
-        </p:txBody>
-      </p:sp>
-      <p:pic>
-        <p:nvPicPr>
-          <p:cNvPr id="5" name="Picture 4">
-            <a:extLst>
-              <a:ext uri="{FF2B5EF4-FFF2-40B4-BE49-F238E27FC236}">
-                <a16:creationId xmlns:a16="http://schemas.microsoft.com/office/drawing/2014/main" xmlns="" id="{EC9799C3-2B3D-4E11-B8E0-90B04A451CE9}"/>
-              </a:ext>
-            </a:extLst>
-          </p:cNvPr>
-          <p:cNvPicPr>
-            <a:picLocks noChangeAspect="1"/>
-          </p:cNvPicPr>
-          <p:nvPr/>
-        </p:nvPicPr>
-        <p:blipFill>
-          <a:blip r:embed="rId2"/>
-          <a:stretch>
-            <a:fillRect/>
-          </a:stretch>
-        </p:blipFill>
-        <p:spPr>
-          <a:xfrm>
-            <a:off x="880427" y="2266731"/>
-            <a:ext cx="3295333" cy="2142709"/>
-          </a:xfrm>
-          <a:prstGeom prst="rect">
-            <a:avLst/>
-          </a:prstGeom>
-        </p:spPr>
-      </p:pic>
-      <p:sp>
-        <p:nvSpPr>
-          <p:cNvPr id="6" name="TextBox 5">
-            <a:extLst>
-              <a:ext uri="{FF2B5EF4-FFF2-40B4-BE49-F238E27FC236}">
-                <a16:creationId xmlns:a16="http://schemas.microsoft.com/office/drawing/2014/main" xmlns="" id="{D18CB254-BC4E-464E-8235-486086BBF8F6}"/>
-              </a:ext>
-            </a:extLst>
-          </p:cNvPr>
-          <p:cNvSpPr txBox="1"/>
-          <p:nvPr/>
-        </p:nvSpPr>
-        <p:spPr>
-          <a:xfrm>
-            <a:off x="1097280" y="2020510"/>
-            <a:ext cx="1657826" cy="261610"/>
-          </a:xfrm>
-          <a:prstGeom prst="rect">
-            <a:avLst/>
-          </a:prstGeom>
-          <a:noFill/>
-        </p:spPr>
-        <p:txBody>
-          <a:bodyPr wrap="none" rtlCol="0">
-            <a:spAutoFit/>
-          </a:bodyPr>
-          <a:lstStyle/>
-          <a:p>
-            <a:r>
-              <a:rPr lang="en-US" sz="1100" b="1" dirty="0"/>
-              <a:t>Number of cases by year</a:t>
+              <a:rPr lang="en-US" dirty="0"/>
+              <a:t>This model uses BERT for text summarization and propose a general framework for extractive models. This is a document-level encoder based on BERT which is able to express the semantics of a document and obtain representations for its sentences. Several inter sentence transformer layers are stacked over the </a:t>
+            </a:r>
+            <a:r>
+              <a:rPr lang="en-US" dirty="0">
+                <a:solidFill>
+                  <a:srgbClr val="FF0000"/>
+                </a:solidFill>
+              </a:rPr>
+              <a:t>BERY</a:t>
+            </a:r>
+            <a:r>
+              <a:rPr lang="en-US" dirty="0"/>
+              <a:t> encoder.</a:t>
             </a:r>
           </a:p>
         </p:txBody>
@@ -6240,7 +6267,7 @@
     </p:spTree>
     <p:extLst>
       <p:ext uri="{BB962C8B-B14F-4D97-AF65-F5344CB8AC3E}">
-        <p14:creationId xmlns:p14="http://schemas.microsoft.com/office/powerpoint/2010/main" val="2751634165"/>
+        <p14:creationId xmlns:p14="http://schemas.microsoft.com/office/powerpoint/2010/main" val="1008779348"/>
       </p:ext>
     </p:extLst>
   </p:cSld>
@@ -6527,7 +6554,7 @@
   <a:extraClrSchemeLst/>
   <a:extLst>
     <a:ext uri="{05A4C25C-085E-4340-85A3-A5531E510DB2}">
-      <thm15:themeFamily xmlns:thm15="http://schemas.microsoft.com/office/thememl/2012/main" xmlns="" name="TWO.pptx" id="{769520F8-BFE5-4C8C-A7AA-375C025A91CE}" vid="{AEAFD717-D3C8-4034-8F7E-D5220B0CCEB8}"/>
+      <thm15:themeFamily xmlns="" xmlns:thm15="http://schemas.microsoft.com/office/thememl/2012/main" name="TWO.pptx" id="{769520F8-BFE5-4C8C-A7AA-375C025A91CE}" vid="{AEAFD717-D3C8-4034-8F7E-D5220B0CCEB8}"/>
     </a:ext>
   </a:extLst>
 </a:theme>

</xml_diff>